<commit_message>
minor edit slides6f, add comment cp6f
</commit_message>
<xml_diff>
--- a/fall11/slidesF11/slides6f.pptx
+++ b/fall11/slidesF11/slides6f.pptx
@@ -15,12 +15,12 @@
     <p:sldId id="376" r:id="rId3"/>
     <p:sldId id="377" r:id="rId4"/>
     <p:sldId id="379" r:id="rId5"/>
-    <p:sldId id="378" r:id="rId6"/>
-    <p:sldId id="440" r:id="rId7"/>
-    <p:sldId id="441" r:id="rId8"/>
-    <p:sldId id="442" r:id="rId9"/>
-    <p:sldId id="380" r:id="rId10"/>
-    <p:sldId id="393" r:id="rId11"/>
+    <p:sldId id="380" r:id="rId6"/>
+    <p:sldId id="393" r:id="rId7"/>
+    <p:sldId id="378" r:id="rId8"/>
+    <p:sldId id="440" r:id="rId9"/>
+    <p:sldId id="441" r:id="rId10"/>
+    <p:sldId id="442" r:id="rId11"/>
     <p:sldId id="381" r:id="rId12"/>
     <p:sldId id="426" r:id="rId13"/>
     <p:sldId id="427" r:id="rId14"/>
@@ -952,7 +952,7 @@
       </p:grpSpPr>
       <p:sp>
         <p:nvSpPr>
-          <p:cNvPr id="35842" name="Rectangle 7"/>
+          <p:cNvPr id="32770" name="Rectangle 7"/>
           <p:cNvSpPr>
             <a:spLocks noGrp="1" noChangeArrowheads="1"/>
           </p:cNvSpPr>
@@ -967,7 +967,7 @@
           <a:bodyPr/>
           <a:lstStyle/>
           <a:p>
-            <a:fld id="{D4DF00B4-AD9D-4EB3-826B-6566E9CCED3E}" type="slidenum">
+            <a:fld id="{402FAC0C-B957-4153-8797-F85E34E6598D}" type="slidenum">
               <a:rPr lang="en-US" smtClean="0"/>
               <a:pPr/>
               <a:t>10</a:t>
@@ -978,7 +978,7 @@
       </p:sp>
       <p:sp>
         <p:nvSpPr>
-          <p:cNvPr id="35843" name="Rectangle 2"/>
+          <p:cNvPr id="32771" name="Rectangle 2"/>
           <p:cNvSpPr>
             <a:spLocks noGrp="1" noRot="1" noChangeAspect="1" noChangeArrowheads="1" noTextEdit="1"/>
           </p:cNvSpPr>
@@ -992,7 +992,7 @@
       </p:sp>
       <p:sp>
         <p:nvSpPr>
-          <p:cNvPr id="35844" name="Rectangle 3"/>
+          <p:cNvPr id="32772" name="Rectangle 3"/>
           <p:cNvSpPr>
             <a:spLocks noGrp="1" noChangeArrowheads="1"/>
           </p:cNvSpPr>
@@ -1658,7 +1658,7 @@
       </p:grpSpPr>
       <p:sp>
         <p:nvSpPr>
-          <p:cNvPr id="32770" name="Rectangle 7"/>
+          <p:cNvPr id="34818" name="Rectangle 7"/>
           <p:cNvSpPr>
             <a:spLocks noGrp="1" noChangeArrowheads="1"/>
           </p:cNvSpPr>
@@ -1673,7 +1673,7 @@
           <a:bodyPr/>
           <a:lstStyle/>
           <a:p>
-            <a:fld id="{402FAC0C-B957-4153-8797-F85E34E6598D}" type="slidenum">
+            <a:fld id="{BFB939FD-17CE-4D53-8988-6B327FFA0115}" type="slidenum">
               <a:rPr lang="en-US" smtClean="0"/>
               <a:pPr/>
               <a:t>5</a:t>
@@ -1684,7 +1684,7 @@
       </p:sp>
       <p:sp>
         <p:nvSpPr>
-          <p:cNvPr id="32771" name="Rectangle 2"/>
+          <p:cNvPr id="34819" name="Rectangle 2"/>
           <p:cNvSpPr>
             <a:spLocks noGrp="1" noRot="1" noChangeAspect="1" noChangeArrowheads="1" noTextEdit="1"/>
           </p:cNvSpPr>
@@ -1698,7 +1698,7 @@
       </p:sp>
       <p:sp>
         <p:nvSpPr>
-          <p:cNvPr id="32772" name="Rectangle 3"/>
+          <p:cNvPr id="34820" name="Rectangle 3"/>
           <p:cNvSpPr>
             <a:spLocks noGrp="1" noChangeArrowheads="1"/>
           </p:cNvSpPr>
@@ -1746,7 +1746,7 @@
       </p:grpSpPr>
       <p:sp>
         <p:nvSpPr>
-          <p:cNvPr id="32770" name="Rectangle 7"/>
+          <p:cNvPr id="35842" name="Rectangle 7"/>
           <p:cNvSpPr>
             <a:spLocks noGrp="1" noChangeArrowheads="1"/>
           </p:cNvSpPr>
@@ -1761,7 +1761,7 @@
           <a:bodyPr/>
           <a:lstStyle/>
           <a:p>
-            <a:fld id="{402FAC0C-B957-4153-8797-F85E34E6598D}" type="slidenum">
+            <a:fld id="{D4DF00B4-AD9D-4EB3-826B-6566E9CCED3E}" type="slidenum">
               <a:rPr lang="en-US" smtClean="0"/>
               <a:pPr/>
               <a:t>6</a:t>
@@ -1772,7 +1772,7 @@
       </p:sp>
       <p:sp>
         <p:nvSpPr>
-          <p:cNvPr id="32771" name="Rectangle 2"/>
+          <p:cNvPr id="35843" name="Rectangle 2"/>
           <p:cNvSpPr>
             <a:spLocks noGrp="1" noRot="1" noChangeAspect="1" noChangeArrowheads="1" noTextEdit="1"/>
           </p:cNvSpPr>
@@ -1786,7 +1786,7 @@
       </p:sp>
       <p:sp>
         <p:nvSpPr>
-          <p:cNvPr id="32772" name="Rectangle 3"/>
+          <p:cNvPr id="35844" name="Rectangle 3"/>
           <p:cNvSpPr>
             <a:spLocks noGrp="1" noChangeArrowheads="1"/>
           </p:cNvSpPr>
@@ -2010,7 +2010,7 @@
       </p:grpSpPr>
       <p:sp>
         <p:nvSpPr>
-          <p:cNvPr id="34818" name="Rectangle 7"/>
+          <p:cNvPr id="32770" name="Rectangle 7"/>
           <p:cNvSpPr>
             <a:spLocks noGrp="1" noChangeArrowheads="1"/>
           </p:cNvSpPr>
@@ -2025,7 +2025,7 @@
           <a:bodyPr/>
           <a:lstStyle/>
           <a:p>
-            <a:fld id="{BFB939FD-17CE-4D53-8988-6B327FFA0115}" type="slidenum">
+            <a:fld id="{402FAC0C-B957-4153-8797-F85E34E6598D}" type="slidenum">
               <a:rPr lang="en-US" smtClean="0"/>
               <a:pPr/>
               <a:t>9</a:t>
@@ -2036,7 +2036,7 @@
       </p:sp>
       <p:sp>
         <p:nvSpPr>
-          <p:cNvPr id="34819" name="Rectangle 2"/>
+          <p:cNvPr id="32771" name="Rectangle 2"/>
           <p:cNvSpPr>
             <a:spLocks noGrp="1" noRot="1" noChangeAspect="1" noChangeArrowheads="1" noTextEdit="1"/>
           </p:cNvSpPr>
@@ -2050,7 +2050,7 @@
       </p:sp>
       <p:sp>
         <p:nvSpPr>
-          <p:cNvPr id="34820" name="Rectangle 3"/>
+          <p:cNvPr id="32772" name="Rectangle 3"/>
           <p:cNvSpPr>
             <a:spLocks noGrp="1" noChangeArrowheads="1"/>
           </p:cNvSpPr>
@@ -2250,7 +2250,15 @@
             </a:r>
             <a:r>
               <a:rPr lang="en-US" sz="1200" dirty="0" smtClean="0"/>
-              <a:t> 6M.‹#›</a:t>
+              <a:t> </a:t>
+            </a:r>
+            <a:r>
+              <a:rPr lang="en-US" sz="1200" dirty="0" smtClean="0"/>
+              <a:t>6F.‹</a:t>
+            </a:r>
+            <a:r>
+              <a:rPr lang="en-US" sz="1200" dirty="0" smtClean="0"/>
+              <a:t>#›</a:t>
             </a:r>
             <a:endParaRPr lang="en-US" sz="1200" dirty="0"/>
           </a:p>
@@ -2421,7 +2429,15 @@
             </a:r>
             <a:r>
               <a:rPr lang="en-US" sz="1200" dirty="0" smtClean="0"/>
-              <a:t> 6M.‹#›</a:t>
+              <a:t> </a:t>
+            </a:r>
+            <a:r>
+              <a:rPr lang="en-US" sz="1200" dirty="0" smtClean="0"/>
+              <a:t>6F.‹</a:t>
+            </a:r>
+            <a:r>
+              <a:rPr lang="en-US" sz="1200" dirty="0" smtClean="0"/>
+              <a:t>#›</a:t>
             </a:r>
             <a:endParaRPr lang="en-US" sz="1200" dirty="0"/>
           </a:p>
@@ -2610,7 +2626,15 @@
             </a:r>
             <a:r>
               <a:rPr lang="en-US" sz="1200" dirty="0" smtClean="0"/>
-              <a:t> 6M.‹#›</a:t>
+              <a:t> </a:t>
+            </a:r>
+            <a:r>
+              <a:rPr lang="en-US" sz="1200" dirty="0" smtClean="0"/>
+              <a:t>6F.‹</a:t>
+            </a:r>
+            <a:r>
+              <a:rPr lang="en-US" sz="1200" dirty="0" smtClean="0"/>
+              <a:t>#›</a:t>
             </a:r>
             <a:endParaRPr lang="en-US" sz="1200" dirty="0"/>
           </a:p>
@@ -2705,7 +2729,11 @@
             </a:r>
             <a:r>
               <a:rPr lang="en-US" dirty="0" smtClean="0"/>
-              <a:t> 6M.</a:t>
+              <a:t> </a:t>
+            </a:r>
+            <a:r>
+              <a:rPr lang="en-US" dirty="0" smtClean="0"/>
+              <a:t>6F.</a:t>
             </a:r>
             <a:fld id="{092F4601-307B-4C24-B8E1-0927D73A950D}" type="slidenum">
               <a:rPr lang="en-US" smtClean="0"/>
@@ -2926,7 +2954,11 @@
             </a:r>
             <a:r>
               <a:rPr lang="en-US" dirty="0" smtClean="0"/>
-              <a:t> 6M.</a:t>
+              <a:t> </a:t>
+            </a:r>
+            <a:r>
+              <a:rPr lang="en-US" dirty="0" smtClean="0"/>
+              <a:t>6F.</a:t>
             </a:r>
             <a:fld id="{7C4E6977-E764-49C2-9B46-F1F7E8372AF3}" type="slidenum">
               <a:rPr lang="en-US" smtClean="0"/>
@@ -3001,7 +3033,11 @@
             </a:r>
             <a:r>
               <a:rPr lang="en-US" dirty="0" smtClean="0"/>
-              <a:t> 6M.</a:t>
+              <a:t> </a:t>
+            </a:r>
+            <a:r>
+              <a:rPr lang="en-US" dirty="0" smtClean="0"/>
+              <a:t>6F.</a:t>
             </a:r>
             <a:fld id="{662DA84E-2EE0-4520-81DD-FF87E285B2C7}" type="slidenum">
               <a:rPr lang="en-US" smtClean="0"/>
@@ -3252,7 +3288,15 @@
             </a:r>
             <a:r>
               <a:rPr lang="en-US" sz="1200" dirty="0" smtClean="0"/>
-              <a:t> 6M.‹#›</a:t>
+              <a:t> </a:t>
+            </a:r>
+            <a:r>
+              <a:rPr lang="en-US" sz="1200" dirty="0" smtClean="0"/>
+              <a:t>6F.</a:t>
+            </a:r>
+            <a:r>
+              <a:rPr lang="en-US" sz="1200" dirty="0" smtClean="0"/>
+              <a:t>‹#›</a:t>
             </a:r>
             <a:endParaRPr lang="en-US" sz="1200" dirty="0"/>
           </a:p>
@@ -3268,8 +3312,8 @@
         </p:nvSpPr>
         <p:spPr>
           <a:xfrm>
-            <a:off x="3162194" y="6553200"/>
-            <a:ext cx="2857606" cy="304800"/>
+            <a:off x="3085994" y="6477000"/>
+            <a:ext cx="3010006" cy="304800"/>
           </a:xfrm>
           <a:prstGeom prst="rect">
             <a:avLst/>
@@ -3309,7 +3353,37 @@
                 <a:uFillTx/>
                 <a:latin typeface="Comic Sans MS" pitchFamily="66" charset="0"/>
               </a:rPr>
-              <a:t>Albert R Meyer           March 7, 2011</a:t>
+              <a:t>Albert R Meyer         </a:t>
+            </a:r>
+            <a:r>
+              <a:rPr kumimoji="0" lang="en-US" sz="1200" b="0" i="0" u="none" strike="noStrike" kern="1200" cap="none" spc="0" normalizeH="0" baseline="0" noProof="0" dirty="0" smtClean="0">
+                <a:ln>
+                  <a:noFill/>
+                </a:ln>
+                <a:solidFill>
+                  <a:schemeClr val="tx1"/>
+                </a:solidFill>
+                <a:effectLst/>
+                <a:uLnTx/>
+                <a:uFillTx/>
+                <a:latin typeface="Comic Sans MS" pitchFamily="66" charset="0"/>
+              </a:rPr>
+              <a:t>October 14, </a:t>
+            </a:r>
+            <a:r>
+              <a:rPr kumimoji="0" lang="en-US" sz="1200" b="0" i="0" u="none" strike="noStrike" kern="1200" cap="none" spc="0" normalizeH="0" baseline="0" noProof="0" dirty="0" smtClean="0">
+                <a:ln>
+                  <a:noFill/>
+                </a:ln>
+                <a:solidFill>
+                  <a:schemeClr val="tx1"/>
+                </a:solidFill>
+                <a:effectLst/>
+                <a:uLnTx/>
+                <a:uFillTx/>
+                <a:latin typeface="Comic Sans MS" pitchFamily="66" charset="0"/>
+              </a:rPr>
+              <a:t>2011</a:t>
             </a:r>
             <a:endParaRPr kumimoji="0" lang="en-US" sz="1200" b="0" i="0" u="none" strike="noStrike" kern="1200" cap="none" spc="0" normalizeH="0" baseline="0" noProof="0" dirty="0">
               <a:ln>
@@ -3784,7 +3858,11 @@
             </a:r>
             <a:r>
               <a:rPr lang="en-US" dirty="0" smtClean="0"/>
-              <a:t> 6M.</a:t>
+              <a:t> </a:t>
+            </a:r>
+            <a:r>
+              <a:rPr lang="en-US" dirty="0" smtClean="0"/>
+              <a:t>6F.</a:t>
             </a:r>
             <a:fld id="{F969F519-7538-4B74-8C91-7BCC0BE33C8C}" type="slidenum">
               <a:rPr lang="en-US" smtClean="0"/>
@@ -3809,8 +3887,8 @@
         </p:nvSpPr>
         <p:spPr>
           <a:xfrm>
-            <a:off x="571500" y="2019300"/>
-            <a:ext cx="8001000" cy="2819400"/>
+            <a:off x="628650" y="2686050"/>
+            <a:ext cx="7886700" cy="1485900"/>
           </a:xfrm>
         </p:spPr>
         <p:txBody>
@@ -3965,9 +4043,13 @@
             </a:r>
             <a:r>
               <a:rPr lang="en-US" dirty="0" smtClean="0"/>
-              <a:t> 6M.</a:t>
-            </a:r>
-            <a:fld id="{39475D55-F769-4D1E-BA0D-F03B0BEACB86}" type="slidenum">
+              <a:t> </a:t>
+            </a:r>
+            <a:r>
+              <a:rPr lang="en-US" dirty="0" smtClean="0"/>
+              <a:t>6F.</a:t>
+            </a:r>
+            <a:fld id="{6A5E9C01-C108-4A5C-AE7A-FB77D488E7D9}" type="slidenum">
               <a:rPr lang="en-US" smtClean="0"/>
               <a:pPr>
                 <a:defRPr/>
@@ -3980,7 +4062,7 @@
       </p:sp>
       <p:sp>
         <p:nvSpPr>
-          <p:cNvPr id="19459" name="Rectangle 2"/>
+          <p:cNvPr id="16387" name="Rectangle 2"/>
           <p:cNvSpPr>
             <a:spLocks noGrp="1" noChangeArrowheads="1"/>
           </p:cNvSpPr>
@@ -3995,15 +4077,29 @@
           <a:p>
             <a:pPr eaLnBrk="1" hangingPunct="1"/>
             <a:r>
-              <a:rPr lang="en-US" sz="4800" smtClean="0"/>
-              <a:t>Why does this work?</a:t>
+              <a:rPr lang="en-US" sz="4400" dirty="0" smtClean="0"/>
+              <a:t>test if </a:t>
+            </a:r>
+            <a:r>
+              <a:rPr lang="en-US" sz="4400" dirty="0" err="1" smtClean="0">
+                <a:solidFill>
+                  <a:schemeClr val="accent1">
+                    <a:lumMod val="50000"/>
+                  </a:schemeClr>
+                </a:solidFill>
+              </a:rPr>
+              <a:t>n</a:t>
+            </a:r>
+            <a:r>
+              <a:rPr lang="en-US" sz="4400" dirty="0" smtClean="0"/>
+              <a:t> is prime</a:t>
             </a:r>
           </a:p>
         </p:txBody>
       </p:sp>
       <p:sp>
         <p:nvSpPr>
-          <p:cNvPr id="35844" name="Rectangle 4"/>
+          <p:cNvPr id="408579" name="Rectangle 3"/>
           <p:cNvSpPr>
             <a:spLocks noGrp="1" noChangeArrowheads="1"/>
           </p:cNvSpPr>
@@ -4013,136 +4109,211 @@
         </p:nvSpPr>
         <p:spPr>
           <a:xfrm>
-            <a:off x="787400" y="1308100"/>
-            <a:ext cx="7594600" cy="2514600"/>
+            <a:off x="457200" y="990600"/>
+            <a:ext cx="8229600" cy="4953000"/>
           </a:xfrm>
         </p:spPr>
         <p:txBody>
           <a:bodyPr/>
           <a:lstStyle/>
           <a:p>
-            <a:pPr eaLnBrk="1" hangingPunct="1">
-              <a:buFontTx/>
-              <a:buNone/>
-              <a:defRPr/>
-            </a:pPr>
-            <a:r>
-              <a:rPr lang="en-US" sz="6600" dirty="0" smtClean="0"/>
-              <a:t>actually works for </a:t>
+            <a:pPr eaLnBrk="1" hangingPunct="1"/>
+            <a:r>
+              <a:rPr lang="en-US" sz="4800" dirty="0" smtClean="0">
+                <a:solidFill>
+                  <a:srgbClr val="000000"/>
+                </a:solidFill>
+                <a:latin typeface="Comic Sans MS"/>
+                <a:cs typeface="Comic Sans MS"/>
+              </a:rPr>
+              <a:t>check if</a:t>
             </a:r>
           </a:p>
           <a:p>
-            <a:pPr eaLnBrk="1" hangingPunct="1">
-              <a:buFontTx/>
-              <a:buNone/>
-              <a:defRPr/>
-            </a:pPr>
-            <a:r>
-              <a:rPr lang="en-US" sz="6600" dirty="0" smtClean="0"/>
-              <a:t>all </a:t>
-            </a:r>
-            <a:r>
-              <a:rPr lang="en-US" sz="6600" dirty="0" smtClean="0">
+            <a:pPr algn="ctr" eaLnBrk="1" hangingPunct="1"/>
+            <a:r>
+              <a:rPr lang="en-US" sz="5400" dirty="0" smtClean="0">
+                <a:solidFill>
+                  <a:srgbClr val="0000E5"/>
+                </a:solidFill>
+                <a:latin typeface="Comic Sans MS"/>
+                <a:cs typeface="Comic Sans MS"/>
+              </a:rPr>
+              <a:t>rem(a</a:t>
+            </a:r>
+            <a:r>
+              <a:rPr lang="en-US" sz="5400" baseline="30000" dirty="0" smtClean="0">
+                <a:solidFill>
+                  <a:srgbClr val="0000E5"/>
+                </a:solidFill>
+                <a:latin typeface="Comic Sans MS"/>
+                <a:cs typeface="Comic Sans MS"/>
+              </a:rPr>
+              <a:t>n-1</a:t>
+            </a:r>
+            <a:r>
+              <a:rPr lang="en-US" sz="5400" dirty="0" smtClean="0">
+                <a:solidFill>
+                  <a:srgbClr val="0000E5"/>
+                </a:solidFill>
+                <a:latin typeface="Comic Sans MS"/>
+                <a:cs typeface="Comic Sans MS"/>
+              </a:rPr>
+              <a:t>, </a:t>
+            </a:r>
+            <a:r>
+              <a:rPr lang="en-US" sz="5400" dirty="0" err="1" smtClean="0">
+                <a:solidFill>
+                  <a:srgbClr val="0000E5"/>
+                </a:solidFill>
+                <a:latin typeface="Comic Sans MS"/>
+                <a:cs typeface="Comic Sans MS"/>
+              </a:rPr>
+              <a:t>n</a:t>
+            </a:r>
+            <a:r>
+              <a:rPr lang="en-US" sz="5400" dirty="0" smtClean="0">
+                <a:solidFill>
+                  <a:srgbClr val="0000E5"/>
+                </a:solidFill>
+                <a:latin typeface="Comic Sans MS"/>
+                <a:cs typeface="Comic Sans MS"/>
+              </a:rPr>
+              <a:t>) = 1</a:t>
+            </a:r>
+          </a:p>
+          <a:p>
+            <a:pPr eaLnBrk="1" hangingPunct="1"/>
+            <a:r>
+              <a:rPr lang="en-US" sz="4800" dirty="0" smtClean="0">
+                <a:solidFill>
+                  <a:schemeClr val="tx2"/>
+                </a:solidFill>
+                <a:latin typeface="Comic Sans MS"/>
+                <a:cs typeface="Comic Sans MS"/>
+              </a:rPr>
+              <a:t>if fails, not prime (Fermat)</a:t>
+            </a:r>
+          </a:p>
+          <a:p>
+            <a:pPr eaLnBrk="1" hangingPunct="1"/>
+            <a:r>
+              <a:rPr lang="en-US" sz="4800" dirty="0" smtClean="0">
+                <a:solidFill>
+                  <a:schemeClr val="tx2"/>
+                </a:solidFill>
+                <a:latin typeface="Comic Sans MS"/>
+                <a:cs typeface="Comic Sans MS"/>
+              </a:rPr>
+              <a:t>choose random</a:t>
+            </a:r>
+            <a:r>
+              <a:rPr lang="en-US" sz="4800" dirty="0" smtClean="0">
                 <a:solidFill>
                   <a:schemeClr val="accent1">
                     <a:lumMod val="50000"/>
                   </a:schemeClr>
                 </a:solidFill>
+                <a:latin typeface="Comic Sans MS"/>
+                <a:cs typeface="Comic Sans MS"/>
               </a:rPr>
-              <a:t>m</a:t>
-            </a:r>
-          </a:p>
-        </p:txBody>
-      </p:sp>
-      <p:sp>
-        <p:nvSpPr>
-          <p:cNvPr id="5" name="TextBox 4"/>
-          <p:cNvSpPr txBox="1"/>
-          <p:nvPr/>
-        </p:nvSpPr>
-        <p:spPr>
-          <a:xfrm>
-            <a:off x="304800" y="2514600"/>
-            <a:ext cx="8496300" cy="2326791"/>
-          </a:xfrm>
-          <a:prstGeom prst="rect">
-            <a:avLst/>
-          </a:prstGeom>
-          <a:noFill/>
-        </p:spPr>
-        <p:txBody>
-          <a:bodyPr wrap="square">
-            <a:spAutoFit/>
-          </a:bodyPr>
-          <a:lstStyle/>
-          <a:p>
-            <a:pPr marL="342900" indent="-342900" eaLnBrk="1" hangingPunct="1">
-              <a:spcBef>
-                <a:spcPct val="20000"/>
-              </a:spcBef>
-              <a:defRPr/>
-            </a:pPr>
-            <a:r>
-              <a:rPr lang="en-US" sz="6600" kern="0" dirty="0" smtClean="0">
+              <a:t> a</a:t>
+            </a:r>
+            <a:r>
+              <a:rPr lang="en-US" sz="4800" dirty="0" smtClean="0">
                 <a:solidFill>
-                  <a:srgbClr val="000000"/>
+                  <a:schemeClr val="tx2"/>
                 </a:solidFill>
                 <a:latin typeface="Comic Sans MS"/>
+                <a:cs typeface="Comic Sans MS"/>
               </a:rPr>
-              <a:t>      </a:t>
-            </a:r>
-            <a:r>
-              <a:rPr lang="en-US" sz="6600" kern="0" dirty="0" smtClean="0">
+              <a:t> in</a:t>
+            </a:r>
+            <a:r>
+              <a:rPr lang="en-US" sz="4800" dirty="0" smtClean="0">
                 <a:solidFill>
-                  <a:schemeClr val="accent5">
+                  <a:srgbClr val="0000E5"/>
+                </a:solidFill>
+                <a:latin typeface="Comic Sans MS"/>
+                <a:cs typeface="Comic Sans MS"/>
+              </a:rPr>
+              <a:t> [1,n)</a:t>
+            </a:r>
+            <a:r>
+              <a:rPr lang="en-US" sz="4800" dirty="0" smtClean="0">
+                <a:latin typeface="Comic Sans MS"/>
+                <a:cs typeface="Comic Sans MS"/>
+              </a:rPr>
+              <a:t>.</a:t>
+            </a:r>
+          </a:p>
+          <a:p>
+            <a:pPr eaLnBrk="1" hangingPunct="1"/>
+            <a:r>
+              <a:rPr lang="en-US" sz="4800" dirty="0" smtClean="0">
+                <a:latin typeface="Comic Sans MS"/>
+                <a:cs typeface="Comic Sans MS"/>
+              </a:rPr>
+              <a:t>if not prime, </a:t>
+            </a:r>
+            <a:r>
+              <a:rPr lang="en-US" sz="4800" dirty="0" err="1" smtClean="0">
+                <a:solidFill>
+                  <a:schemeClr val="accent1">
                     <a:lumMod val="50000"/>
                   </a:schemeClr>
                 </a:solidFill>
                 <a:latin typeface="Comic Sans MS"/>
+                <a:cs typeface="Comic Sans MS"/>
               </a:rPr>
-              <a:t>   </a:t>
-            </a:r>
-            <a:r>
-              <a:rPr lang="en-US" sz="6600" kern="0" dirty="0" smtClean="0">
+              <a:t>Pr(fails</a:t>
+            </a:r>
+            <a:r>
+              <a:rPr lang="en-US" sz="4800" dirty="0" smtClean="0">
                 <a:solidFill>
-                  <a:srgbClr val="000000"/>
+                  <a:schemeClr val="accent1">
+                    <a:lumMod val="50000"/>
+                  </a:schemeClr>
                 </a:solidFill>
                 <a:latin typeface="Comic Sans MS"/>
+                <a:cs typeface="Comic Sans MS"/>
               </a:rPr>
-              <a:t>  … explained </a:t>
-            </a:r>
-            <a:r>
-              <a:rPr lang="en-US" sz="6600" kern="0" dirty="0">
+              <a:t>)</a:t>
+            </a:r>
+            <a:r>
+              <a:rPr lang="en-US" sz="4800" b="1" dirty="0" smtClean="0">
                 <a:solidFill>
-                  <a:srgbClr val="000000"/>
+                  <a:schemeClr val="accent1">
+                    <a:lumMod val="50000"/>
+                  </a:schemeClr>
+                </a:solidFill>
+                <a:latin typeface="Euclid Symbol" charset="2"/>
+                <a:cs typeface="Euclid Symbol" charset="2"/>
+              </a:rPr>
+              <a:t>&gt;</a:t>
+            </a:r>
+            <a:r>
+              <a:rPr lang="en-US" sz="4800" dirty="0" smtClean="0">
+                <a:solidFill>
+                  <a:schemeClr val="accent1">
+                    <a:lumMod val="50000"/>
+                  </a:schemeClr>
                 </a:solidFill>
                 <a:latin typeface="Comic Sans MS"/>
+                <a:cs typeface="Comic Sans MS"/>
               </a:rPr>
-              <a:t>in</a:t>
+              <a:t>1/2</a:t>
             </a:r>
           </a:p>
           <a:p>
-            <a:pPr marL="342900" indent="-342900" eaLnBrk="1" hangingPunct="1">
-              <a:spcBef>
-                <a:spcPct val="20000"/>
-              </a:spcBef>
-              <a:defRPr/>
-            </a:pPr>
-            <a:r>
-              <a:rPr lang="en-US" sz="6600" kern="0" dirty="0" smtClean="0">
-                <a:solidFill>
-                  <a:srgbClr val="000000"/>
-                </a:solidFill>
+            <a:pPr eaLnBrk="1" hangingPunct="1"/>
+            <a:r>
+              <a:rPr lang="en-US" sz="4000" dirty="0" smtClean="0">
                 <a:latin typeface="Comic Sans MS"/>
+                <a:cs typeface="Comic Sans MS"/>
               </a:rPr>
-              <a:t>  Class Problem 2</a:t>
-            </a:r>
-            <a:endParaRPr lang="en-US" sz="6600" kern="0" dirty="0">
-              <a:solidFill>
-                <a:srgbClr val="000000"/>
-              </a:solidFill>
-              <a:latin typeface="Comic Sans MS"/>
-            </a:endParaRPr>
+              <a:t>(with rare exceptions) </a:t>
+            </a:r>
           </a:p>
         </p:txBody>
       </p:sp>
@@ -4151,8 +4322,8 @@
   <p:clrMapOvr>
     <a:masterClrMapping/>
   </p:clrMapOvr>
-  <p:transition xmlns:p14="http://schemas.microsoft.com/office/powerpoint/2010/main">
-    <p:fade/>
+  <p:transition xmlns:p14="http://schemas.microsoft.com/office/powerpoint/2010/main" spd="med">
+    <p:fade thruBlk="1"/>
   </p:transition>
   <p:timing>
     <p:tnLst>
@@ -4175,7 +4346,7 @@
                             </p:stCondLst>
                             <p:childTnLst>
                               <p:par>
-                                <p:cTn id="5" presetID="1" presetClass="entr" presetSubtype="0" fill="hold" grpId="0" nodeType="clickEffect">
+                                <p:cTn id="5" presetID="9" presetClass="entr" presetSubtype="0" fill="hold" grpId="0" nodeType="clickEffect">
                                   <p:stCondLst>
                                     <p:cond delay="0"/>
                                   </p:stCondLst>
@@ -4188,7 +4359,11 @@
                                           </p:stCondLst>
                                         </p:cTn>
                                         <p:tgtEl>
-                                          <p:spTgt spid="5"/>
+                                          <p:spTgt spid="408579">
+                                            <p:txEl>
+                                              <p:pRg st="1" end="1"/>
+                                            </p:txEl>
+                                          </p:spTgt>
                                         </p:tgtEl>
                                         <p:attrNameLst>
                                           <p:attrName>style.visibility</p:attrName>
@@ -4198,6 +4373,253 @@
                                         <p:strVal val="visible"/>
                                       </p:to>
                                     </p:set>
+                                    <p:animEffect transition="in" filter="dissolve">
+                                      <p:cBhvr>
+                                        <p:cTn id="7" dur="500"/>
+                                        <p:tgtEl>
+                                          <p:spTgt spid="408579">
+                                            <p:txEl>
+                                              <p:pRg st="1" end="1"/>
+                                            </p:txEl>
+                                          </p:spTgt>
+                                        </p:tgtEl>
+                                      </p:cBhvr>
+                                    </p:animEffect>
+                                  </p:childTnLst>
+                                </p:cTn>
+                              </p:par>
+                            </p:childTnLst>
+                          </p:cTn>
+                        </p:par>
+                      </p:childTnLst>
+                    </p:cTn>
+                  </p:par>
+                  <p:par>
+                    <p:cTn id="8" fill="hold">
+                      <p:stCondLst>
+                        <p:cond delay="indefinite"/>
+                      </p:stCondLst>
+                      <p:childTnLst>
+                        <p:par>
+                          <p:cTn id="9" fill="hold">
+                            <p:stCondLst>
+                              <p:cond delay="0"/>
+                            </p:stCondLst>
+                            <p:childTnLst>
+                              <p:par>
+                                <p:cTn id="10" presetID="9" presetClass="entr" presetSubtype="0" fill="hold" grpId="0" nodeType="clickEffect">
+                                  <p:stCondLst>
+                                    <p:cond delay="0"/>
+                                  </p:stCondLst>
+                                  <p:childTnLst>
+                                    <p:set>
+                                      <p:cBhvr>
+                                        <p:cTn id="11" dur="1" fill="hold">
+                                          <p:stCondLst>
+                                            <p:cond delay="0"/>
+                                          </p:stCondLst>
+                                        </p:cTn>
+                                        <p:tgtEl>
+                                          <p:spTgt spid="408579">
+                                            <p:txEl>
+                                              <p:pRg st="2" end="2"/>
+                                            </p:txEl>
+                                          </p:spTgt>
+                                        </p:tgtEl>
+                                        <p:attrNameLst>
+                                          <p:attrName>style.visibility</p:attrName>
+                                        </p:attrNameLst>
+                                      </p:cBhvr>
+                                      <p:to>
+                                        <p:strVal val="visible"/>
+                                      </p:to>
+                                    </p:set>
+                                    <p:animEffect transition="in" filter="dissolve">
+                                      <p:cBhvr>
+                                        <p:cTn id="12" dur="500"/>
+                                        <p:tgtEl>
+                                          <p:spTgt spid="408579">
+                                            <p:txEl>
+                                              <p:pRg st="2" end="2"/>
+                                            </p:txEl>
+                                          </p:spTgt>
+                                        </p:tgtEl>
+                                      </p:cBhvr>
+                                    </p:animEffect>
+                                  </p:childTnLst>
+                                </p:cTn>
+                              </p:par>
+                            </p:childTnLst>
+                          </p:cTn>
+                        </p:par>
+                      </p:childTnLst>
+                    </p:cTn>
+                  </p:par>
+                  <p:par>
+                    <p:cTn id="13" fill="hold">
+                      <p:stCondLst>
+                        <p:cond delay="indefinite"/>
+                      </p:stCondLst>
+                      <p:childTnLst>
+                        <p:par>
+                          <p:cTn id="14" fill="hold">
+                            <p:stCondLst>
+                              <p:cond delay="0"/>
+                            </p:stCondLst>
+                            <p:childTnLst>
+                              <p:par>
+                                <p:cTn id="15" presetID="9" presetClass="entr" presetSubtype="0" fill="hold" grpId="0" nodeType="clickEffect">
+                                  <p:stCondLst>
+                                    <p:cond delay="0"/>
+                                  </p:stCondLst>
+                                  <p:childTnLst>
+                                    <p:set>
+                                      <p:cBhvr>
+                                        <p:cTn id="16" dur="1" fill="hold">
+                                          <p:stCondLst>
+                                            <p:cond delay="0"/>
+                                          </p:stCondLst>
+                                        </p:cTn>
+                                        <p:tgtEl>
+                                          <p:spTgt spid="408579">
+                                            <p:txEl>
+                                              <p:pRg st="3" end="3"/>
+                                            </p:txEl>
+                                          </p:spTgt>
+                                        </p:tgtEl>
+                                        <p:attrNameLst>
+                                          <p:attrName>style.visibility</p:attrName>
+                                        </p:attrNameLst>
+                                      </p:cBhvr>
+                                      <p:to>
+                                        <p:strVal val="visible"/>
+                                      </p:to>
+                                    </p:set>
+                                    <p:animEffect transition="in" filter="dissolve">
+                                      <p:cBhvr>
+                                        <p:cTn id="17" dur="500"/>
+                                        <p:tgtEl>
+                                          <p:spTgt spid="408579">
+                                            <p:txEl>
+                                              <p:pRg st="3" end="3"/>
+                                            </p:txEl>
+                                          </p:spTgt>
+                                        </p:tgtEl>
+                                      </p:cBhvr>
+                                    </p:animEffect>
+                                  </p:childTnLst>
+                                </p:cTn>
+                              </p:par>
+                            </p:childTnLst>
+                          </p:cTn>
+                        </p:par>
+                      </p:childTnLst>
+                    </p:cTn>
+                  </p:par>
+                  <p:par>
+                    <p:cTn id="18" fill="hold">
+                      <p:stCondLst>
+                        <p:cond delay="indefinite"/>
+                      </p:stCondLst>
+                      <p:childTnLst>
+                        <p:par>
+                          <p:cTn id="19" fill="hold">
+                            <p:stCondLst>
+                              <p:cond delay="0"/>
+                            </p:stCondLst>
+                            <p:childTnLst>
+                              <p:par>
+                                <p:cTn id="20" presetID="9" presetClass="entr" presetSubtype="0" fill="hold" grpId="0" nodeType="clickEffect">
+                                  <p:stCondLst>
+                                    <p:cond delay="0"/>
+                                  </p:stCondLst>
+                                  <p:childTnLst>
+                                    <p:set>
+                                      <p:cBhvr>
+                                        <p:cTn id="21" dur="1" fill="hold">
+                                          <p:stCondLst>
+                                            <p:cond delay="0"/>
+                                          </p:stCondLst>
+                                        </p:cTn>
+                                        <p:tgtEl>
+                                          <p:spTgt spid="408579">
+                                            <p:txEl>
+                                              <p:pRg st="4" end="4"/>
+                                            </p:txEl>
+                                          </p:spTgt>
+                                        </p:tgtEl>
+                                        <p:attrNameLst>
+                                          <p:attrName>style.visibility</p:attrName>
+                                        </p:attrNameLst>
+                                      </p:cBhvr>
+                                      <p:to>
+                                        <p:strVal val="visible"/>
+                                      </p:to>
+                                    </p:set>
+                                    <p:animEffect transition="in" filter="dissolve">
+                                      <p:cBhvr>
+                                        <p:cTn id="22" dur="500"/>
+                                        <p:tgtEl>
+                                          <p:spTgt spid="408579">
+                                            <p:txEl>
+                                              <p:pRg st="4" end="4"/>
+                                            </p:txEl>
+                                          </p:spTgt>
+                                        </p:tgtEl>
+                                      </p:cBhvr>
+                                    </p:animEffect>
+                                  </p:childTnLst>
+                                </p:cTn>
+                              </p:par>
+                            </p:childTnLst>
+                          </p:cTn>
+                        </p:par>
+                        <p:par>
+                          <p:cTn id="23" fill="hold">
+                            <p:stCondLst>
+                              <p:cond delay="500"/>
+                            </p:stCondLst>
+                            <p:childTnLst>
+                              <p:par>
+                                <p:cTn id="24" presetID="9" presetClass="entr" presetSubtype="0" fill="hold" grpId="0" nodeType="afterEffect">
+                                  <p:stCondLst>
+                                    <p:cond delay="0"/>
+                                  </p:stCondLst>
+                                  <p:childTnLst>
+                                    <p:set>
+                                      <p:cBhvr>
+                                        <p:cTn id="25" dur="1" fill="hold">
+                                          <p:stCondLst>
+                                            <p:cond delay="0"/>
+                                          </p:stCondLst>
+                                        </p:cTn>
+                                        <p:tgtEl>
+                                          <p:spTgt spid="408579">
+                                            <p:txEl>
+                                              <p:pRg st="5" end="5"/>
+                                            </p:txEl>
+                                          </p:spTgt>
+                                        </p:tgtEl>
+                                        <p:attrNameLst>
+                                          <p:attrName>style.visibility</p:attrName>
+                                        </p:attrNameLst>
+                                      </p:cBhvr>
+                                      <p:to>
+                                        <p:strVal val="visible"/>
+                                      </p:to>
+                                    </p:set>
+                                    <p:animEffect transition="in" filter="dissolve">
+                                      <p:cBhvr>
+                                        <p:cTn id="26" dur="500"/>
+                                        <p:tgtEl>
+                                          <p:spTgt spid="408579">
+                                            <p:txEl>
+                                              <p:pRg st="5" end="5"/>
+                                            </p:txEl>
+                                          </p:spTgt>
+                                        </p:tgtEl>
+                                      </p:cBhvr>
+                                    </p:animEffect>
                                   </p:childTnLst>
                                 </p:cTn>
                               </p:par>
@@ -4229,7 +4651,7 @@
       </p:par>
     </p:tnLst>
     <p:bldLst>
-      <p:bldP spid="5" grpId="0"/>
+      <p:bldP spid="408579" grpId="0" uiExpand="1" build="p"/>
     </p:bldLst>
   </p:timing>
 </p:sld>
@@ -4281,7 +4703,11 @@
             </a:r>
             <a:r>
               <a:rPr lang="en-US" dirty="0" smtClean="0"/>
-              <a:t> 6M.</a:t>
+              <a:t> </a:t>
+            </a:r>
+            <a:r>
+              <a:rPr lang="en-US" dirty="0" smtClean="0"/>
+              <a:t>6F.</a:t>
             </a:r>
             <a:fld id="{F389C0C6-D6B8-4BCF-9EE6-7CFCBB0EDCA3}" type="slidenum">
               <a:rPr lang="en-US" smtClean="0"/>
@@ -4895,12 +5321,24 @@
               <a:defRPr/>
             </a:pPr>
             <a:r>
-              <a:rPr lang="en-US" smtClean="0"/>
+              <a:rPr lang="en-US" dirty="0" err="1" smtClean="0"/>
               <a:t>l</a:t>
             </a:r>
             <a:r>
-              <a:rPr lang="en-US" sz="1200" smtClean="0"/>
-              <a:t>ec 6M.‹#›</a:t>
+              <a:rPr lang="en-US" sz="1200" dirty="0" err="1" smtClean="0"/>
+              <a:t>ec</a:t>
+            </a:r>
+            <a:r>
+              <a:rPr lang="en-US" sz="1200" dirty="0" smtClean="0"/>
+              <a:t> </a:t>
+            </a:r>
+            <a:r>
+              <a:rPr lang="en-US" sz="1200" dirty="0" smtClean="0"/>
+              <a:t>6F.‹</a:t>
+            </a:r>
+            <a:r>
+              <a:rPr lang="en-US" sz="1200" dirty="0" smtClean="0"/>
+              <a:t>#›</a:t>
             </a:r>
             <a:endParaRPr lang="en-US" sz="1200" dirty="0"/>
           </a:p>
@@ -6016,7 +6454,18 @@
   <p:clrMapOvr>
     <a:masterClrMapping/>
   </p:clrMapOvr>
-  <p:transition xmlns:p14="http://schemas.microsoft.com/office/powerpoint/2010/main"/>
+  <mc:AlternateContent xmlns:mc="http://schemas.openxmlformats.org/markup-compatibility/2006">
+    <mc:Choice xmlns:p14="http://schemas.microsoft.com/office/powerpoint/2010/main" Requires="p14">
+      <p:transition spd="slow" p14:dur="1700">
+        <p:fade thruBlk="1"/>
+      </p:transition>
+    </mc:Choice>
+    <mc:Fallback>
+      <p:transition xmlns:p14="http://schemas.microsoft.com/office/powerpoint/2010/main" spd="slow">
+        <p:fade thruBlk="1"/>
+      </p:transition>
+    </mc:Fallback>
+  </mc:AlternateContent>
   <p:timing>
     <p:tnLst>
       <p:par>
@@ -6268,12 +6717,24 @@
               <a:defRPr/>
             </a:pPr>
             <a:r>
-              <a:rPr lang="en-US" smtClean="0"/>
+              <a:rPr lang="en-US" dirty="0" err="1" smtClean="0"/>
               <a:t>l</a:t>
             </a:r>
             <a:r>
-              <a:rPr lang="en-US" sz="1200" smtClean="0"/>
-              <a:t>ec 6M.‹#›</a:t>
+              <a:rPr lang="en-US" sz="1200" dirty="0" err="1" smtClean="0"/>
+              <a:t>ec</a:t>
+            </a:r>
+            <a:r>
+              <a:rPr lang="en-US" sz="1200" dirty="0" smtClean="0"/>
+              <a:t> </a:t>
+            </a:r>
+            <a:r>
+              <a:rPr lang="en-US" sz="1200" dirty="0" smtClean="0"/>
+              <a:t>6F.‹</a:t>
+            </a:r>
+            <a:r>
+              <a:rPr lang="en-US" sz="1200" dirty="0" smtClean="0"/>
+              <a:t>#›</a:t>
             </a:r>
             <a:endParaRPr lang="en-US" sz="1200" dirty="0"/>
           </a:p>
@@ -7629,12 +8090,24 @@
               <a:defRPr/>
             </a:pPr>
             <a:r>
-              <a:rPr lang="en-US" smtClean="0"/>
+              <a:rPr lang="en-US" dirty="0" err="1" smtClean="0"/>
               <a:t>l</a:t>
             </a:r>
             <a:r>
-              <a:rPr lang="en-US" sz="1200" smtClean="0"/>
-              <a:t>ec 6M.‹#›</a:t>
+              <a:rPr lang="en-US" sz="1200" dirty="0" err="1" smtClean="0"/>
+              <a:t>ec</a:t>
+            </a:r>
+            <a:r>
+              <a:rPr lang="en-US" sz="1200" dirty="0" smtClean="0"/>
+              <a:t> </a:t>
+            </a:r>
+            <a:r>
+              <a:rPr lang="en-US" sz="1200" dirty="0" smtClean="0"/>
+              <a:t>6F.‹</a:t>
+            </a:r>
+            <a:r>
+              <a:rPr lang="en-US" sz="1200" dirty="0" smtClean="0"/>
+              <a:t>#›</a:t>
             </a:r>
             <a:endParaRPr lang="en-US" sz="1200" dirty="0"/>
           </a:p>
@@ -9281,12 +9754,24 @@
               <a:defRPr/>
             </a:pPr>
             <a:r>
-              <a:rPr lang="en-US" smtClean="0"/>
+              <a:rPr lang="en-US" dirty="0" err="1" smtClean="0"/>
               <a:t>l</a:t>
             </a:r>
             <a:r>
-              <a:rPr lang="en-US" sz="1200" smtClean="0"/>
-              <a:t>ec 6M.‹#›</a:t>
+              <a:rPr lang="en-US" sz="1200" dirty="0" err="1" smtClean="0"/>
+              <a:t>ec</a:t>
+            </a:r>
+            <a:r>
+              <a:rPr lang="en-US" sz="1200" dirty="0" smtClean="0"/>
+              <a:t> </a:t>
+            </a:r>
+            <a:r>
+              <a:rPr lang="en-US" sz="1200" dirty="0" smtClean="0"/>
+              <a:t>6F.‹</a:t>
+            </a:r>
+            <a:r>
+              <a:rPr lang="en-US" sz="1200" dirty="0" smtClean="0"/>
+              <a:t>#›</a:t>
             </a:r>
             <a:endParaRPr lang="en-US" sz="1200" dirty="0"/>
           </a:p>
@@ -11017,12 +11502,24 @@
               <a:defRPr/>
             </a:pPr>
             <a:r>
-              <a:rPr lang="en-US" smtClean="0"/>
+              <a:rPr lang="en-US" dirty="0" err="1" smtClean="0"/>
               <a:t>l</a:t>
             </a:r>
             <a:r>
-              <a:rPr lang="en-US" sz="1200" smtClean="0"/>
-              <a:t>ec 6M.‹#›</a:t>
+              <a:rPr lang="en-US" sz="1200" dirty="0" err="1" smtClean="0"/>
+              <a:t>ec</a:t>
+            </a:r>
+            <a:r>
+              <a:rPr lang="en-US" sz="1200" dirty="0" smtClean="0"/>
+              <a:t> </a:t>
+            </a:r>
+            <a:r>
+              <a:rPr lang="en-US" sz="1200" dirty="0" smtClean="0"/>
+              <a:t>6F.‹</a:t>
+            </a:r>
+            <a:r>
+              <a:rPr lang="en-US" sz="1200" dirty="0" smtClean="0"/>
+              <a:t>#›</a:t>
             </a:r>
             <a:endParaRPr lang="en-US" sz="1200" dirty="0"/>
           </a:p>
@@ -12639,12 +13136,24 @@
               <a:defRPr/>
             </a:pPr>
             <a:r>
-              <a:rPr lang="en-US" smtClean="0"/>
+              <a:rPr lang="en-US" dirty="0" err="1" smtClean="0"/>
               <a:t>l</a:t>
             </a:r>
             <a:r>
-              <a:rPr lang="en-US" sz="1200" smtClean="0"/>
-              <a:t>ec 6M.‹#›</a:t>
+              <a:rPr lang="en-US" sz="1200" dirty="0" err="1" smtClean="0"/>
+              <a:t>ec</a:t>
+            </a:r>
+            <a:r>
+              <a:rPr lang="en-US" sz="1200" dirty="0" smtClean="0"/>
+              <a:t> </a:t>
+            </a:r>
+            <a:r>
+              <a:rPr lang="en-US" sz="1200" dirty="0" smtClean="0"/>
+              <a:t>6F.‹</a:t>
+            </a:r>
+            <a:r>
+              <a:rPr lang="en-US" sz="1200" dirty="0" smtClean="0"/>
+              <a:t>#›</a:t>
             </a:r>
             <a:endParaRPr lang="en-US" sz="1200" dirty="0"/>
           </a:p>
@@ -14424,12 +14933,24 @@
               <a:defRPr/>
             </a:pPr>
             <a:r>
-              <a:rPr lang="en-US" smtClean="0"/>
+              <a:rPr lang="en-US" dirty="0" err="1" smtClean="0"/>
               <a:t>l</a:t>
             </a:r>
             <a:r>
-              <a:rPr lang="en-US" sz="1200" smtClean="0"/>
-              <a:t>ec 6M.‹#›</a:t>
+              <a:rPr lang="en-US" sz="1200" dirty="0" err="1" smtClean="0"/>
+              <a:t>ec</a:t>
+            </a:r>
+            <a:r>
+              <a:rPr lang="en-US" sz="1200" dirty="0" smtClean="0"/>
+              <a:t> </a:t>
+            </a:r>
+            <a:r>
+              <a:rPr lang="en-US" sz="1200" dirty="0" smtClean="0"/>
+              <a:t>6F.‹</a:t>
+            </a:r>
+            <a:r>
+              <a:rPr lang="en-US" sz="1200" dirty="0" smtClean="0"/>
+              <a:t>#›</a:t>
             </a:r>
             <a:endParaRPr lang="en-US" sz="1200" dirty="0"/>
           </a:p>
@@ -16046,12 +16567,24 @@
               <a:defRPr/>
             </a:pPr>
             <a:r>
-              <a:rPr lang="en-US" smtClean="0"/>
+              <a:rPr lang="en-US" dirty="0" err="1" smtClean="0"/>
               <a:t>l</a:t>
             </a:r>
             <a:r>
-              <a:rPr lang="en-US" sz="1200" smtClean="0"/>
-              <a:t>ec 6M.‹#›</a:t>
+              <a:rPr lang="en-US" sz="1200" dirty="0" err="1" smtClean="0"/>
+              <a:t>ec</a:t>
+            </a:r>
+            <a:r>
+              <a:rPr lang="en-US" sz="1200" dirty="0" smtClean="0"/>
+              <a:t> </a:t>
+            </a:r>
+            <a:r>
+              <a:rPr lang="en-US" sz="1200" dirty="0" smtClean="0"/>
+              <a:t>6F.‹</a:t>
+            </a:r>
+            <a:r>
+              <a:rPr lang="en-US" sz="1200" dirty="0" smtClean="0"/>
+              <a:t>#›</a:t>
             </a:r>
             <a:endParaRPr lang="en-US" sz="1200" dirty="0"/>
           </a:p>
@@ -17655,7 +18188,11 @@
             </a:r>
             <a:r>
               <a:rPr lang="en-US" dirty="0" smtClean="0"/>
-              <a:t> 6M.</a:t>
+              <a:t> </a:t>
+            </a:r>
+            <a:r>
+              <a:rPr lang="en-US" dirty="0" smtClean="0"/>
+              <a:t>6F.</a:t>
             </a:r>
             <a:fld id="{03D159E7-7261-456C-B1C2-8B1BCE6FD8AA}" type="slidenum">
               <a:rPr lang="en-US" smtClean="0"/>
@@ -17793,12 +18330,24 @@
               <a:defRPr/>
             </a:pPr>
             <a:r>
-              <a:rPr lang="en-US" smtClean="0"/>
+              <a:rPr lang="en-US" dirty="0" err="1" smtClean="0"/>
               <a:t>l</a:t>
             </a:r>
             <a:r>
-              <a:rPr lang="en-US" sz="1200" smtClean="0"/>
-              <a:t>ec 6M.‹#›</a:t>
+              <a:rPr lang="en-US" sz="1200" dirty="0" err="1" smtClean="0"/>
+              <a:t>ec</a:t>
+            </a:r>
+            <a:r>
+              <a:rPr lang="en-US" sz="1200" dirty="0" smtClean="0"/>
+              <a:t> </a:t>
+            </a:r>
+            <a:r>
+              <a:rPr lang="en-US" sz="1200" dirty="0" smtClean="0"/>
+              <a:t>6F.‹</a:t>
+            </a:r>
+            <a:r>
+              <a:rPr lang="en-US" sz="1200" dirty="0" smtClean="0"/>
+              <a:t>#›</a:t>
             </a:r>
             <a:endParaRPr lang="en-US" sz="1200" dirty="0"/>
           </a:p>
@@ -19542,12 +20091,24 @@
               <a:defRPr/>
             </a:pPr>
             <a:r>
-              <a:rPr lang="en-US" smtClean="0"/>
+              <a:rPr lang="en-US" dirty="0" err="1" smtClean="0"/>
               <a:t>l</a:t>
             </a:r>
             <a:r>
-              <a:rPr lang="en-US" sz="1200" smtClean="0"/>
-              <a:t>ec 6M.‹#›</a:t>
+              <a:rPr lang="en-US" sz="1200" dirty="0" err="1" smtClean="0"/>
+              <a:t>ec</a:t>
+            </a:r>
+            <a:r>
+              <a:rPr lang="en-US" sz="1200" dirty="0" smtClean="0"/>
+              <a:t> </a:t>
+            </a:r>
+            <a:r>
+              <a:rPr lang="en-US" sz="1200" dirty="0" smtClean="0"/>
+              <a:t>6F.‹</a:t>
+            </a:r>
+            <a:r>
+              <a:rPr lang="en-US" sz="1200" dirty="0" smtClean="0"/>
+              <a:t>#›</a:t>
             </a:r>
             <a:endParaRPr lang="en-US" sz="1200" dirty="0"/>
           </a:p>
@@ -21091,8 +21652,8 @@
         </p:nvSpPr>
         <p:spPr>
           <a:xfrm>
-            <a:off x="76200" y="1143000"/>
-            <a:ext cx="8991600" cy="4953000"/>
+            <a:off x="152400" y="1676400"/>
+            <a:ext cx="8915400" cy="3429000"/>
           </a:xfrm>
         </p:spPr>
         <p:txBody>
@@ -21103,20 +21664,6 @@
             <a:r>
               <a:rPr lang="en-US" sz="4400" dirty="0" smtClean="0"/>
               <a:t>SAT-solvers work on formulas. </a:t>
-            </a:r>
-          </a:p>
-          <a:p>
-            <a:pPr eaLnBrk="1" hangingPunct="1"/>
-            <a:r>
-              <a:rPr lang="en-US" sz="4400" dirty="0" smtClean="0"/>
-              <a:t>Formula equivalent to circuit</a:t>
-            </a:r>
-          </a:p>
-          <a:p>
-            <a:pPr eaLnBrk="1" hangingPunct="1"/>
-            <a:r>
-              <a:rPr lang="en-US" sz="4400" dirty="0" smtClean="0"/>
-              <a:t>may be too big to check.</a:t>
             </a:r>
           </a:p>
           <a:p>
@@ -21149,11 +21696,12 @@
             <a:pPr eaLnBrk="1" hangingPunct="1"/>
             <a:r>
               <a:rPr lang="en-US" sz="4400" dirty="0" smtClean="0"/>
-              <a:t>about the same size as circuit.</a:t>
-            </a:r>
-          </a:p>
-          <a:p>
-            <a:pPr eaLnBrk="1" hangingPunct="1"/>
+              <a:t>about the same size as circuit</a:t>
+            </a:r>
+            <a:r>
+              <a:rPr lang="en-US" sz="4400" dirty="0" smtClean="0"/>
+              <a:t>.</a:t>
+            </a:r>
             <a:endParaRPr lang="en-US" sz="4400" dirty="0"/>
           </a:p>
         </p:txBody>
@@ -21187,7 +21735,11 @@
             </a:r>
             <a:r>
               <a:rPr lang="en-US" dirty="0" smtClean="0"/>
-              <a:t> 6M.</a:t>
+              <a:t> </a:t>
+            </a:r>
+            <a:r>
+              <a:rPr lang="en-US" dirty="0" smtClean="0"/>
+              <a:t>6F.</a:t>
             </a:r>
             <a:fld id="{F389C0C6-D6B8-4BCF-9EE6-7CFCBB0EDCA3}" type="slidenum">
               <a:rPr lang="en-US" smtClean="0"/>
@@ -21517,110 +22069,6 @@
                                   </p:childTnLst>
                                 </p:cTn>
                               </p:par>
-                              <p:par>
-                                <p:cTn id="21" presetID="10" presetClass="entr" presetSubtype="0" fill="hold" grpId="0" nodeType="withEffect">
-                                  <p:stCondLst>
-                                    <p:cond delay="0"/>
-                                  </p:stCondLst>
-                                  <p:childTnLst>
-                                    <p:set>
-                                      <p:cBhvr>
-                                        <p:cTn id="22" dur="1" fill="hold">
-                                          <p:stCondLst>
-                                            <p:cond delay="0"/>
-                                          </p:stCondLst>
-                                        </p:cTn>
-                                        <p:tgtEl>
-                                          <p:spTgt spid="61443">
-                                            <p:txEl>
-                                              <p:pRg st="4" end="4"/>
-                                            </p:txEl>
-                                          </p:spTgt>
-                                        </p:tgtEl>
-                                        <p:attrNameLst>
-                                          <p:attrName>style.visibility</p:attrName>
-                                        </p:attrNameLst>
-                                      </p:cBhvr>
-                                      <p:to>
-                                        <p:strVal val="visible"/>
-                                      </p:to>
-                                    </p:set>
-                                    <p:animEffect transition="in" filter="fade">
-                                      <p:cBhvr>
-                                        <p:cTn id="23" dur="500"/>
-                                        <p:tgtEl>
-                                          <p:spTgt spid="61443">
-                                            <p:txEl>
-                                              <p:pRg st="4" end="4"/>
-                                            </p:txEl>
-                                          </p:spTgt>
-                                        </p:tgtEl>
-                                      </p:cBhvr>
-                                    </p:animEffect>
-                                  </p:childTnLst>
-                                </p:cTn>
-                              </p:par>
-                            </p:childTnLst>
-                          </p:cTn>
-                        </p:par>
-                      </p:childTnLst>
-                    </p:cTn>
-                  </p:par>
-                  <p:par>
-                    <p:cTn id="24" fill="hold">
-                      <p:stCondLst>
-                        <p:cond delay="indefinite"/>
-                      </p:stCondLst>
-                      <p:childTnLst>
-                        <p:par>
-                          <p:cTn id="25" fill="hold">
-                            <p:stCondLst>
-                              <p:cond delay="0"/>
-                            </p:stCondLst>
-                            <p:childTnLst>
-                              <p:par>
-                                <p:cTn id="26" presetID="10" presetClass="entr" presetSubtype="0" fill="hold" grpId="0" nodeType="clickEffect">
-                                  <p:stCondLst>
-                                    <p:cond delay="0"/>
-                                  </p:stCondLst>
-                                  <p:childTnLst>
-                                    <p:set>
-                                      <p:cBhvr>
-                                        <p:cTn id="27" dur="1" fill="hold">
-                                          <p:stCondLst>
-                                            <p:cond delay="0"/>
-                                          </p:stCondLst>
-                                        </p:cTn>
-                                        <p:tgtEl>
-                                          <p:spTgt spid="61443">
-                                            <p:txEl>
-                                              <p:pRg st="5" end="5"/>
-                                            </p:txEl>
-                                          </p:spTgt>
-                                        </p:tgtEl>
-                                        <p:attrNameLst>
-                                          <p:attrName>style.visibility</p:attrName>
-                                        </p:attrNameLst>
-                                      </p:cBhvr>
-                                      <p:to>
-                                        <p:strVal val="visible"/>
-                                      </p:to>
-                                    </p:set>
-                                    <p:animEffect transition="in" filter="fade">
-                                      <p:cBhvr>
-                                        <p:cTn id="28" dur="500"/>
-                                        <p:tgtEl>
-                                          <p:spTgt spid="61443">
-                                            <p:txEl>
-                                              <p:pRg st="5" end="5"/>
-                                            </p:txEl>
-                                          </p:spTgt>
-                                        </p:tgtEl>
-                                      </p:cBhvr>
-                                    </p:animEffect>
-                                  </p:childTnLst>
-                                </p:cTn>
-                              </p:par>
                             </p:childTnLst>
                           </p:cTn>
                         </p:par>
@@ -21707,8 +22155,8 @@
         </p:nvSpPr>
         <p:spPr>
           <a:xfrm>
-            <a:off x="38100" y="2286000"/>
-            <a:ext cx="9029700" cy="2286000"/>
+            <a:off x="114300" y="1219200"/>
+            <a:ext cx="8953500" cy="4419600"/>
           </a:xfrm>
         </p:spPr>
         <p:txBody>
@@ -21718,7 +22166,18 @@
             <a:pPr algn="ctr" eaLnBrk="1" hangingPunct="1"/>
             <a:r>
               <a:rPr lang="en-US" sz="12700" dirty="0" smtClean="0"/>
-              <a:t>Problem </a:t>
+              <a:t>Problems</a:t>
+            </a:r>
+          </a:p>
+          <a:p>
+            <a:pPr algn="ctr" eaLnBrk="1" hangingPunct="1"/>
+            <a:r>
+              <a:rPr lang="en-US" sz="12700" dirty="0" smtClean="0"/>
+              <a:t>1 &amp;</a:t>
+            </a:r>
+            <a:r>
+              <a:rPr lang="en-US" sz="12700" dirty="0" smtClean="0"/>
+              <a:t> </a:t>
             </a:r>
             <a:r>
               <a:rPr lang="en-US" sz="12700" dirty="0" smtClean="0">
@@ -21759,7 +22218,11 @@
             </a:r>
             <a:r>
               <a:rPr lang="en-US" dirty="0" smtClean="0"/>
-              <a:t> 6M.</a:t>
+              <a:t> </a:t>
+            </a:r>
+            <a:r>
+              <a:rPr lang="en-US" dirty="0" smtClean="0"/>
+              <a:t>6F.</a:t>
             </a:r>
             <a:fld id="{F389C0C6-D6B8-4BCF-9EE6-7CFCBB0EDCA3}" type="slidenum">
               <a:rPr lang="en-US" smtClean="0"/>
@@ -21917,12 +22380,24 @@
               <a:defRPr/>
             </a:pPr>
             <a:r>
-              <a:rPr lang="en-US" smtClean="0"/>
+              <a:rPr lang="en-US" dirty="0" err="1" smtClean="0"/>
               <a:t>l</a:t>
             </a:r>
             <a:r>
-              <a:rPr lang="en-US" sz="1200" smtClean="0"/>
-              <a:t>ec 6M.‹#›</a:t>
+              <a:rPr lang="en-US" sz="1200" dirty="0" err="1" smtClean="0"/>
+              <a:t>ec</a:t>
+            </a:r>
+            <a:r>
+              <a:rPr lang="en-US" sz="1200" dirty="0" smtClean="0"/>
+              <a:t> </a:t>
+            </a:r>
+            <a:r>
+              <a:rPr lang="en-US" sz="1200" dirty="0" smtClean="0"/>
+              <a:t>6F.‹</a:t>
+            </a:r>
+            <a:r>
+              <a:rPr lang="en-US" sz="1200" dirty="0" smtClean="0"/>
+              <a:t>#›</a:t>
             </a:r>
             <a:endParaRPr lang="en-US" sz="1200" dirty="0"/>
           </a:p>
@@ -21990,7 +22465,11 @@
             </a:r>
             <a:r>
               <a:rPr lang="en-US" dirty="0" smtClean="0"/>
-              <a:t> 6M.</a:t>
+              <a:t> </a:t>
+            </a:r>
+            <a:r>
+              <a:rPr lang="en-US" dirty="0" smtClean="0"/>
+              <a:t>6F.</a:t>
             </a:r>
             <a:fld id="{EAE0CE3F-24F2-4E10-908C-002F0BCF9C89}" type="slidenum">
               <a:rPr lang="en-US" smtClean="0"/>
@@ -22283,7 +22762,15 @@
                   <a:srgbClr val="FF00FF"/>
                 </a:solidFill>
               </a:rPr>
-              <a:t>secret key</a:t>
+              <a:t>private </a:t>
+            </a:r>
+            <a:r>
+              <a:rPr lang="en-US" sz="4400" dirty="0" smtClean="0">
+                <a:solidFill>
+                  <a:srgbClr val="FF00FF"/>
+                </a:solidFill>
+              </a:rPr>
+              <a:t>key</a:t>
             </a:r>
             <a:r>
               <a:rPr lang="en-US" sz="4400" dirty="0" smtClean="0"/>
@@ -22748,7 +23235,11 @@
             </a:r>
             <a:r>
               <a:rPr lang="en-US" dirty="0" smtClean="0"/>
-              <a:t> 6M.</a:t>
+              <a:t> </a:t>
+            </a:r>
+            <a:r>
+              <a:rPr lang="en-US" dirty="0" smtClean="0"/>
+              <a:t>6F.</a:t>
             </a:r>
             <a:fld id="{2E667B6B-E035-4178-9988-2F3A62346836}" type="slidenum">
               <a:rPr lang="en-US" smtClean="0"/>
@@ -23414,14 +23905,520 @@
             </a:r>
             <a:r>
               <a:rPr lang="en-US" dirty="0" smtClean="0"/>
-              <a:t> 6M.</a:t>
+              <a:t> </a:t>
+            </a:r>
+            <a:r>
+              <a:rPr lang="en-US" dirty="0" smtClean="0"/>
+              <a:t>6F.</a:t>
+            </a:r>
+            <a:fld id="{3C84E341-AEF3-493B-A8EE-DBBF671E8583}" type="slidenum">
+              <a:rPr lang="en-US" smtClean="0"/>
+              <a:pPr>
+                <a:defRPr/>
+              </a:pPr>
+              <a:t>5</a:t>
+            </a:fld>
+            <a:endParaRPr lang="en-US" dirty="0"/>
+          </a:p>
+        </p:txBody>
+      </p:sp>
+      <p:sp>
+        <p:nvSpPr>
+          <p:cNvPr id="18435" name="Rectangle 2"/>
+          <p:cNvSpPr>
+            <a:spLocks noGrp="1" noChangeArrowheads="1"/>
+          </p:cNvSpPr>
+          <p:nvPr>
+            <p:ph type="title"/>
+          </p:nvPr>
+        </p:nvSpPr>
+        <p:spPr/>
+        <p:txBody>
+          <a:bodyPr/>
+          <a:lstStyle/>
+          <a:p>
+            <a:pPr eaLnBrk="1" hangingPunct="1"/>
+            <a:r>
+              <a:rPr lang="en-US" sz="4800" smtClean="0"/>
+              <a:t>Why does this work?</a:t>
+            </a:r>
+          </a:p>
+        </p:txBody>
+      </p:sp>
+      <p:sp>
+        <p:nvSpPr>
+          <p:cNvPr id="35844" name="Rectangle 4"/>
+          <p:cNvSpPr>
+            <a:spLocks noGrp="1" noChangeArrowheads="1"/>
+          </p:cNvSpPr>
+          <p:nvPr>
+            <p:ph type="body" idx="1"/>
+          </p:nvPr>
+        </p:nvSpPr>
+        <p:spPr>
+          <a:xfrm>
+            <a:off x="533400" y="1600200"/>
+            <a:ext cx="8026400" cy="3505200"/>
+          </a:xfrm>
+        </p:spPr>
+        <p:txBody>
+          <a:bodyPr/>
+          <a:lstStyle/>
+          <a:p>
+            <a:pPr eaLnBrk="1" hangingPunct="1">
+              <a:buFontTx/>
+              <a:buNone/>
+              <a:defRPr/>
+            </a:pPr>
+            <a:r>
+              <a:rPr lang="en-US" sz="6000" dirty="0" smtClean="0"/>
+              <a:t>follows easily from </a:t>
+            </a:r>
+          </a:p>
+          <a:p>
+            <a:pPr eaLnBrk="1" hangingPunct="1">
+              <a:buFontTx/>
+              <a:buNone/>
+              <a:defRPr/>
+            </a:pPr>
+            <a:r>
+              <a:rPr lang="en-US" sz="6000" dirty="0" smtClean="0"/>
+              <a:t>Euler’s Theorem when</a:t>
+            </a:r>
+          </a:p>
+          <a:p>
+            <a:pPr eaLnBrk="1" hangingPunct="1">
+              <a:buFontTx/>
+              <a:buNone/>
+              <a:defRPr/>
+            </a:pPr>
+            <a:r>
+              <a:rPr lang="en-US" sz="6000" dirty="0" smtClean="0">
+                <a:solidFill>
+                  <a:schemeClr val="accent5">
+                    <a:lumMod val="50000"/>
+                  </a:schemeClr>
+                </a:solidFill>
+              </a:rPr>
+              <a:t>m</a:t>
+            </a:r>
+            <a:r>
+              <a:rPr lang="en-US" sz="6000" dirty="0" smtClean="0"/>
+              <a:t> has inverse mod </a:t>
+            </a:r>
+            <a:r>
+              <a:rPr lang="en-US" sz="6000" dirty="0" smtClean="0">
+                <a:solidFill>
+                  <a:schemeClr val="accent5">
+                    <a:lumMod val="50000"/>
+                  </a:schemeClr>
+                </a:solidFill>
+              </a:rPr>
+              <a:t>n</a:t>
+            </a:r>
+            <a:r>
+              <a:rPr lang="en-US" sz="6000" dirty="0" smtClean="0"/>
+              <a:t> </a:t>
+            </a:r>
+          </a:p>
+        </p:txBody>
+      </p:sp>
+    </p:spTree>
+  </p:cSld>
+  <p:clrMapOvr>
+    <a:masterClrMapping/>
+  </p:clrMapOvr>
+  <p:transition xmlns:p14="http://schemas.microsoft.com/office/powerpoint/2010/main">
+    <p:fade/>
+  </p:transition>
+  <p:timing>
+    <p:tnLst>
+      <p:par>
+        <p:cTn xmlns:p14="http://schemas.microsoft.com/office/powerpoint/2010/main" id="1" dur="indefinite" restart="never" nodeType="tmRoot"/>
+      </p:par>
+    </p:tnLst>
+  </p:timing>
+</p:sld>
+</file>
+
+<file path=ppt/slides/slide6.xml><?xml version="1.0" encoding="utf-8"?>
+<p:sld xmlns:a="http://schemas.openxmlformats.org/drawingml/2006/main" xmlns:r="http://schemas.openxmlformats.org/officeDocument/2006/relationships" xmlns:p="http://schemas.openxmlformats.org/presentationml/2006/main">
+  <p:cSld>
+    <p:spTree>
+      <p:nvGrpSpPr>
+        <p:cNvPr id="1" name=""/>
+        <p:cNvGrpSpPr/>
+        <p:nvPr/>
+      </p:nvGrpSpPr>
+      <p:grpSpPr>
+        <a:xfrm>
+          <a:off x="0" y="0"/>
+          <a:ext cx="0" cy="0"/>
+          <a:chOff x="0" y="0"/>
+          <a:chExt cx="0" cy="0"/>
+        </a:xfrm>
+      </p:grpSpPr>
+      <p:sp>
+        <p:nvSpPr>
+          <p:cNvPr id="4" name="Slide Number Placeholder 3"/>
+          <p:cNvSpPr>
+            <a:spLocks noGrp="1"/>
+          </p:cNvSpPr>
+          <p:nvPr>
+            <p:ph type="sldNum" sz="quarter" idx="4"/>
+          </p:nvPr>
+        </p:nvSpPr>
+        <p:spPr>
+          <a:xfrm>
+            <a:off x="6477000" y="6553200"/>
+            <a:ext cx="2667000" cy="307777"/>
+          </a:xfrm>
+        </p:spPr>
+        <p:txBody>
+          <a:bodyPr/>
+          <a:lstStyle/>
+          <a:p>
+            <a:pPr>
+              <a:defRPr/>
+            </a:pPr>
+            <a:r>
+              <a:rPr lang="en-US" dirty="0" err="1" smtClean="0"/>
+              <a:t>lec</a:t>
+            </a:r>
+            <a:r>
+              <a:rPr lang="en-US" dirty="0" smtClean="0"/>
+              <a:t> </a:t>
+            </a:r>
+            <a:r>
+              <a:rPr lang="en-US" dirty="0" smtClean="0"/>
+              <a:t>6F.</a:t>
+            </a:r>
+            <a:fld id="{39475D55-F769-4D1E-BA0D-F03B0BEACB86}" type="slidenum">
+              <a:rPr lang="en-US" smtClean="0"/>
+              <a:pPr>
+                <a:defRPr/>
+              </a:pPr>
+              <a:t>6</a:t>
+            </a:fld>
+            <a:endParaRPr lang="en-US" dirty="0"/>
+          </a:p>
+        </p:txBody>
+      </p:sp>
+      <p:sp>
+        <p:nvSpPr>
+          <p:cNvPr id="19459" name="Rectangle 2"/>
+          <p:cNvSpPr>
+            <a:spLocks noGrp="1" noChangeArrowheads="1"/>
+          </p:cNvSpPr>
+          <p:nvPr>
+            <p:ph type="title"/>
+          </p:nvPr>
+        </p:nvSpPr>
+        <p:spPr/>
+        <p:txBody>
+          <a:bodyPr/>
+          <a:lstStyle/>
+          <a:p>
+            <a:pPr eaLnBrk="1" hangingPunct="1"/>
+            <a:r>
+              <a:rPr lang="en-US" sz="4800" smtClean="0"/>
+              <a:t>Why does this work?</a:t>
+            </a:r>
+          </a:p>
+        </p:txBody>
+      </p:sp>
+      <p:sp>
+        <p:nvSpPr>
+          <p:cNvPr id="35844" name="Rectangle 4"/>
+          <p:cNvSpPr>
+            <a:spLocks noGrp="1" noChangeArrowheads="1"/>
+          </p:cNvSpPr>
+          <p:nvPr>
+            <p:ph type="body" idx="1"/>
+          </p:nvPr>
+        </p:nvSpPr>
+        <p:spPr>
+          <a:xfrm>
+            <a:off x="787400" y="1308100"/>
+            <a:ext cx="7594600" cy="2514600"/>
+          </a:xfrm>
+        </p:spPr>
+        <p:txBody>
+          <a:bodyPr/>
+          <a:lstStyle/>
+          <a:p>
+            <a:pPr eaLnBrk="1" hangingPunct="1">
+              <a:buFontTx/>
+              <a:buNone/>
+              <a:defRPr/>
+            </a:pPr>
+            <a:r>
+              <a:rPr lang="en-US" sz="6600" dirty="0" smtClean="0"/>
+              <a:t>actually works for </a:t>
+            </a:r>
+          </a:p>
+          <a:p>
+            <a:pPr eaLnBrk="1" hangingPunct="1">
+              <a:buFontTx/>
+              <a:buNone/>
+              <a:defRPr/>
+            </a:pPr>
+            <a:r>
+              <a:rPr lang="en-US" sz="6600" dirty="0" smtClean="0"/>
+              <a:t>all </a:t>
+            </a:r>
+            <a:r>
+              <a:rPr lang="en-US" sz="6600" dirty="0" smtClean="0">
+                <a:solidFill>
+                  <a:schemeClr val="accent1">
+                    <a:lumMod val="50000"/>
+                  </a:schemeClr>
+                </a:solidFill>
+              </a:rPr>
+              <a:t>m</a:t>
+            </a:r>
+          </a:p>
+        </p:txBody>
+      </p:sp>
+      <p:sp>
+        <p:nvSpPr>
+          <p:cNvPr id="5" name="TextBox 4"/>
+          <p:cNvSpPr txBox="1"/>
+          <p:nvPr/>
+        </p:nvSpPr>
+        <p:spPr>
+          <a:xfrm>
+            <a:off x="304800" y="2514600"/>
+            <a:ext cx="8496300" cy="2326791"/>
+          </a:xfrm>
+          <a:prstGeom prst="rect">
+            <a:avLst/>
+          </a:prstGeom>
+          <a:noFill/>
+        </p:spPr>
+        <p:txBody>
+          <a:bodyPr wrap="square">
+            <a:spAutoFit/>
+          </a:bodyPr>
+          <a:lstStyle/>
+          <a:p>
+            <a:pPr marL="342900" indent="-342900" eaLnBrk="1" hangingPunct="1">
+              <a:spcBef>
+                <a:spcPct val="20000"/>
+              </a:spcBef>
+              <a:defRPr/>
+            </a:pPr>
+            <a:r>
+              <a:rPr lang="en-US" sz="6600" kern="0" dirty="0" smtClean="0">
+                <a:solidFill>
+                  <a:srgbClr val="000000"/>
+                </a:solidFill>
+                <a:latin typeface="Comic Sans MS"/>
+              </a:rPr>
+              <a:t>      </a:t>
+            </a:r>
+            <a:r>
+              <a:rPr lang="en-US" sz="6600" kern="0" dirty="0" smtClean="0">
+                <a:solidFill>
+                  <a:schemeClr val="accent5">
+                    <a:lumMod val="50000"/>
+                  </a:schemeClr>
+                </a:solidFill>
+                <a:latin typeface="Comic Sans MS"/>
+              </a:rPr>
+              <a:t>   </a:t>
+            </a:r>
+            <a:r>
+              <a:rPr lang="en-US" sz="6600" kern="0" dirty="0" smtClean="0">
+                <a:solidFill>
+                  <a:srgbClr val="000000"/>
+                </a:solidFill>
+                <a:latin typeface="Comic Sans MS"/>
+              </a:rPr>
+              <a:t>  … explained </a:t>
+            </a:r>
+            <a:r>
+              <a:rPr lang="en-US" sz="6600" kern="0" dirty="0">
+                <a:solidFill>
+                  <a:srgbClr val="000000"/>
+                </a:solidFill>
+                <a:latin typeface="Comic Sans MS"/>
+              </a:rPr>
+              <a:t>in</a:t>
+            </a:r>
+          </a:p>
+          <a:p>
+            <a:pPr marL="342900" indent="-342900" eaLnBrk="1" hangingPunct="1">
+              <a:spcBef>
+                <a:spcPct val="20000"/>
+              </a:spcBef>
+              <a:defRPr/>
+            </a:pPr>
+            <a:r>
+              <a:rPr lang="en-US" sz="6600" kern="0" dirty="0" smtClean="0">
+                <a:solidFill>
+                  <a:srgbClr val="000000"/>
+                </a:solidFill>
+                <a:latin typeface="Comic Sans MS"/>
+              </a:rPr>
+              <a:t>  Class Problem 2</a:t>
+            </a:r>
+            <a:endParaRPr lang="en-US" sz="6600" kern="0" dirty="0">
+              <a:solidFill>
+                <a:srgbClr val="000000"/>
+              </a:solidFill>
+              <a:latin typeface="Comic Sans MS"/>
+            </a:endParaRPr>
+          </a:p>
+        </p:txBody>
+      </p:sp>
+    </p:spTree>
+  </p:cSld>
+  <p:clrMapOvr>
+    <a:masterClrMapping/>
+  </p:clrMapOvr>
+  <p:transition xmlns:p14="http://schemas.microsoft.com/office/powerpoint/2010/main">
+    <p:fade/>
+  </p:transition>
+  <p:timing>
+    <p:tnLst>
+      <p:par>
+        <p:cTn xmlns:p14="http://schemas.microsoft.com/office/powerpoint/2010/main" id="1" dur="indefinite" restart="never" nodeType="tmRoot">
+          <p:childTnLst>
+            <p:seq concurrent="1" nextAc="seek">
+              <p:cTn id="2" dur="indefinite" nodeType="mainSeq">
+                <p:childTnLst>
+                  <p:par>
+                    <p:cTn id="3" fill="hold">
+                      <p:stCondLst>
+                        <p:cond delay="indefinite"/>
+                      </p:stCondLst>
+                      <p:childTnLst>
+                        <p:par>
+                          <p:cTn id="4" fill="hold">
+                            <p:stCondLst>
+                              <p:cond delay="0"/>
+                            </p:stCondLst>
+                            <p:childTnLst>
+                              <p:par>
+                                <p:cTn id="5" presetID="1" presetClass="entr" presetSubtype="0" fill="hold" grpId="0" nodeType="clickEffect">
+                                  <p:stCondLst>
+                                    <p:cond delay="0"/>
+                                  </p:stCondLst>
+                                  <p:childTnLst>
+                                    <p:set>
+                                      <p:cBhvr>
+                                        <p:cTn id="6" dur="1" fill="hold">
+                                          <p:stCondLst>
+                                            <p:cond delay="0"/>
+                                          </p:stCondLst>
+                                        </p:cTn>
+                                        <p:tgtEl>
+                                          <p:spTgt spid="5"/>
+                                        </p:tgtEl>
+                                        <p:attrNameLst>
+                                          <p:attrName>style.visibility</p:attrName>
+                                        </p:attrNameLst>
+                                      </p:cBhvr>
+                                      <p:to>
+                                        <p:strVal val="visible"/>
+                                      </p:to>
+                                    </p:set>
+                                  </p:childTnLst>
+                                </p:cTn>
+                              </p:par>
+                            </p:childTnLst>
+                          </p:cTn>
+                        </p:par>
+                      </p:childTnLst>
+                    </p:cTn>
+                  </p:par>
+                </p:childTnLst>
+              </p:cTn>
+              <p:prevCondLst>
+                <p:cond evt="onPrev" delay="0">
+                  <p:tgtEl>
+                    <p:sldTgt/>
+                  </p:tgtEl>
+                </p:cond>
+              </p:prevCondLst>
+              <p:nextCondLst>
+                <p:cond evt="onNext" delay="0">
+                  <p:tgtEl>
+                    <p:sldTgt/>
+                  </p:tgtEl>
+                </p:cond>
+              </p:nextCondLst>
+            </p:seq>
+          </p:childTnLst>
+        </p:cTn>
+      </p:par>
+    </p:tnLst>
+    <p:bldLst>
+      <p:bldP spid="5" grpId="0"/>
+    </p:bldLst>
+  </p:timing>
+</p:sld>
+</file>
+
+<file path=ppt/slides/slide7.xml><?xml version="1.0" encoding="utf-8"?>
+<p:sld xmlns:a="http://schemas.openxmlformats.org/drawingml/2006/main" xmlns:r="http://schemas.openxmlformats.org/officeDocument/2006/relationships" xmlns:p="http://schemas.openxmlformats.org/presentationml/2006/main">
+  <p:cSld>
+    <p:spTree>
+      <p:nvGrpSpPr>
+        <p:cNvPr id="1" name=""/>
+        <p:cNvGrpSpPr/>
+        <p:nvPr/>
+      </p:nvGrpSpPr>
+      <p:grpSpPr>
+        <a:xfrm>
+          <a:off x="0" y="0"/>
+          <a:ext cx="0" cy="0"/>
+          <a:chOff x="0" y="0"/>
+          <a:chExt cx="0" cy="0"/>
+        </a:xfrm>
+      </p:grpSpPr>
+      <p:sp>
+        <p:nvSpPr>
+          <p:cNvPr id="4" name="Slide Number Placeholder 3"/>
+          <p:cNvSpPr>
+            <a:spLocks noGrp="1"/>
+          </p:cNvSpPr>
+          <p:nvPr>
+            <p:ph type="sldNum" sz="quarter" idx="4"/>
+          </p:nvPr>
+        </p:nvSpPr>
+        <p:spPr>
+          <a:xfrm>
+            <a:off x="6477000" y="6553200"/>
+            <a:ext cx="2667000" cy="307777"/>
+          </a:xfrm>
+        </p:spPr>
+        <p:txBody>
+          <a:bodyPr/>
+          <a:lstStyle/>
+          <a:p>
+            <a:pPr>
+              <a:defRPr/>
+            </a:pPr>
+            <a:r>
+              <a:rPr lang="en-US" dirty="0" err="1" smtClean="0"/>
+              <a:t>lec</a:t>
+            </a:r>
+            <a:r>
+              <a:rPr lang="en-US" dirty="0" smtClean="0"/>
+              <a:t> </a:t>
+            </a:r>
+            <a:r>
+              <a:rPr lang="en-US" dirty="0" smtClean="0"/>
+              <a:t>6F.</a:t>
             </a:r>
             <a:fld id="{6A5E9C01-C108-4A5C-AE7A-FB77D488E7D9}" type="slidenum">
               <a:rPr lang="en-US" smtClean="0"/>
               <a:pPr>
                 <a:defRPr/>
               </a:pPr>
-              <a:t>5</a:t>
+              <a:t>7</a:t>
             </a:fld>
             <a:endParaRPr lang="en-US" dirty="0"/>
           </a:p>
@@ -23894,7 +24891,7 @@
 </p:sld>
 </file>
 
-<file path=ppt/slides/slide6.xml><?xml version="1.0" encoding="utf-8"?>
+<file path=ppt/slides/slide8.xml><?xml version="1.0" encoding="utf-8"?>
 <p:sld xmlns:a="http://schemas.openxmlformats.org/drawingml/2006/main" xmlns:r="http://schemas.openxmlformats.org/officeDocument/2006/relationships" xmlns:p="http://schemas.openxmlformats.org/presentationml/2006/main">
   <p:cSld>
     <p:spTree>
@@ -23940,14 +24937,18 @@
             </a:r>
             <a:r>
               <a:rPr lang="en-US" dirty="0" smtClean="0"/>
-              <a:t> 6M.</a:t>
+              <a:t> </a:t>
+            </a:r>
+            <a:r>
+              <a:rPr lang="en-US" dirty="0" smtClean="0"/>
+              <a:t>6F.</a:t>
             </a:r>
             <a:fld id="{6A5E9C01-C108-4A5C-AE7A-FB77D488E7D9}" type="slidenum">
               <a:rPr lang="en-US" smtClean="0"/>
               <a:pPr>
                 <a:defRPr/>
               </a:pPr>
-              <a:t>6</a:t>
+              <a:t>8</a:t>
             </a:fld>
             <a:endParaRPr lang="en-US" dirty="0"/>
           </a:p>
@@ -24667,7 +25668,7 @@
 </p:sld>
 </file>
 
-<file path=ppt/slides/slide7.xml><?xml version="1.0" encoding="utf-8"?>
+<file path=ppt/slides/slide9.xml><?xml version="1.0" encoding="utf-8"?>
 <p:sld xmlns:a="http://schemas.openxmlformats.org/drawingml/2006/main" xmlns:r="http://schemas.openxmlformats.org/officeDocument/2006/relationships" xmlns:p="http://schemas.openxmlformats.org/presentationml/2006/main">
   <p:cSld>
     <p:spTree>
@@ -24713,14 +25714,18 @@
             </a:r>
             <a:r>
               <a:rPr lang="en-US" dirty="0" smtClean="0"/>
-              <a:t> 6M.</a:t>
+              <a:t> </a:t>
+            </a:r>
+            <a:r>
+              <a:rPr lang="en-US" dirty="0" smtClean="0"/>
+              <a:t>6F.</a:t>
             </a:r>
             <a:fld id="{6A5E9C01-C108-4A5C-AE7A-FB77D488E7D9}" type="slidenum">
               <a:rPr lang="en-US" smtClean="0"/>
               <a:pPr>
                 <a:defRPr/>
               </a:pPr>
-              <a:t>7</a:t>
+              <a:t>9</a:t>
             </a:fld>
             <a:endParaRPr lang="en-US" dirty="0"/>
           </a:p>
@@ -25070,840 +26075,6 @@
     <p:bldLst>
       <p:bldP spid="408579" grpId="1" build="p"/>
     </p:bldLst>
-  </p:timing>
-</p:sld>
-</file>
-
-<file path=ppt/slides/slide8.xml><?xml version="1.0" encoding="utf-8"?>
-<p:sld xmlns:a="http://schemas.openxmlformats.org/drawingml/2006/main" xmlns:r="http://schemas.openxmlformats.org/officeDocument/2006/relationships" xmlns:p="http://schemas.openxmlformats.org/presentationml/2006/main">
-  <p:cSld>
-    <p:spTree>
-      <p:nvGrpSpPr>
-        <p:cNvPr id="1" name=""/>
-        <p:cNvGrpSpPr/>
-        <p:nvPr/>
-      </p:nvGrpSpPr>
-      <p:grpSpPr>
-        <a:xfrm>
-          <a:off x="0" y="0"/>
-          <a:ext cx="0" cy="0"/>
-          <a:chOff x="0" y="0"/>
-          <a:chExt cx="0" cy="0"/>
-        </a:xfrm>
-      </p:grpSpPr>
-      <p:sp>
-        <p:nvSpPr>
-          <p:cNvPr id="4" name="Slide Number Placeholder 3"/>
-          <p:cNvSpPr>
-            <a:spLocks noGrp="1"/>
-          </p:cNvSpPr>
-          <p:nvPr>
-            <p:ph type="sldNum" sz="quarter" idx="4"/>
-          </p:nvPr>
-        </p:nvSpPr>
-        <p:spPr>
-          <a:xfrm>
-            <a:off x="6477000" y="6553200"/>
-            <a:ext cx="2667000" cy="307777"/>
-          </a:xfrm>
-        </p:spPr>
-        <p:txBody>
-          <a:bodyPr/>
-          <a:lstStyle/>
-          <a:p>
-            <a:pPr>
-              <a:defRPr/>
-            </a:pPr>
-            <a:r>
-              <a:rPr lang="en-US" dirty="0" err="1" smtClean="0"/>
-              <a:t>lec</a:t>
-            </a:r>
-            <a:r>
-              <a:rPr lang="en-US" dirty="0" smtClean="0"/>
-              <a:t> 6M.</a:t>
-            </a:r>
-            <a:fld id="{6A5E9C01-C108-4A5C-AE7A-FB77D488E7D9}" type="slidenum">
-              <a:rPr lang="en-US" smtClean="0"/>
-              <a:pPr>
-                <a:defRPr/>
-              </a:pPr>
-              <a:t>8</a:t>
-            </a:fld>
-            <a:endParaRPr lang="en-US" dirty="0"/>
-          </a:p>
-        </p:txBody>
-      </p:sp>
-      <p:sp>
-        <p:nvSpPr>
-          <p:cNvPr id="16387" name="Rectangle 2"/>
-          <p:cNvSpPr>
-            <a:spLocks noGrp="1" noChangeArrowheads="1"/>
-          </p:cNvSpPr>
-          <p:nvPr>
-            <p:ph type="title"/>
-          </p:nvPr>
-        </p:nvSpPr>
-        <p:spPr/>
-        <p:txBody>
-          <a:bodyPr/>
-          <a:lstStyle/>
-          <a:p>
-            <a:pPr eaLnBrk="1" hangingPunct="1"/>
-            <a:r>
-              <a:rPr lang="en-US" sz="4400" dirty="0" smtClean="0"/>
-              <a:t>test if </a:t>
-            </a:r>
-            <a:r>
-              <a:rPr lang="en-US" sz="4400" dirty="0" err="1" smtClean="0">
-                <a:solidFill>
-                  <a:schemeClr val="accent1">
-                    <a:lumMod val="50000"/>
-                  </a:schemeClr>
-                </a:solidFill>
-              </a:rPr>
-              <a:t>n</a:t>
-            </a:r>
-            <a:r>
-              <a:rPr lang="en-US" sz="4400" dirty="0" smtClean="0"/>
-              <a:t> is prime</a:t>
-            </a:r>
-          </a:p>
-        </p:txBody>
-      </p:sp>
-      <p:sp>
-        <p:nvSpPr>
-          <p:cNvPr id="408579" name="Rectangle 3"/>
-          <p:cNvSpPr>
-            <a:spLocks noGrp="1" noChangeArrowheads="1"/>
-          </p:cNvSpPr>
-          <p:nvPr>
-            <p:ph type="body" idx="1"/>
-          </p:nvPr>
-        </p:nvSpPr>
-        <p:spPr>
-          <a:xfrm>
-            <a:off x="457200" y="990600"/>
-            <a:ext cx="8229600" cy="4953000"/>
-          </a:xfrm>
-        </p:spPr>
-        <p:txBody>
-          <a:bodyPr/>
-          <a:lstStyle/>
-          <a:p>
-            <a:pPr eaLnBrk="1" hangingPunct="1"/>
-            <a:r>
-              <a:rPr lang="en-US" sz="4800" dirty="0" smtClean="0">
-                <a:solidFill>
-                  <a:srgbClr val="000000"/>
-                </a:solidFill>
-                <a:latin typeface="Comic Sans MS"/>
-                <a:cs typeface="Comic Sans MS"/>
-              </a:rPr>
-              <a:t>check if</a:t>
-            </a:r>
-          </a:p>
-          <a:p>
-            <a:pPr algn="ctr" eaLnBrk="1" hangingPunct="1"/>
-            <a:r>
-              <a:rPr lang="en-US" sz="5400" dirty="0" smtClean="0">
-                <a:solidFill>
-                  <a:srgbClr val="0000E5"/>
-                </a:solidFill>
-                <a:latin typeface="Comic Sans MS"/>
-                <a:cs typeface="Comic Sans MS"/>
-              </a:rPr>
-              <a:t>rem(a</a:t>
-            </a:r>
-            <a:r>
-              <a:rPr lang="en-US" sz="5400" baseline="30000" dirty="0" smtClean="0">
-                <a:solidFill>
-                  <a:srgbClr val="0000E5"/>
-                </a:solidFill>
-                <a:latin typeface="Comic Sans MS"/>
-                <a:cs typeface="Comic Sans MS"/>
-              </a:rPr>
-              <a:t>n-1</a:t>
-            </a:r>
-            <a:r>
-              <a:rPr lang="en-US" sz="5400" dirty="0" smtClean="0">
-                <a:solidFill>
-                  <a:srgbClr val="0000E5"/>
-                </a:solidFill>
-                <a:latin typeface="Comic Sans MS"/>
-                <a:cs typeface="Comic Sans MS"/>
-              </a:rPr>
-              <a:t>, </a:t>
-            </a:r>
-            <a:r>
-              <a:rPr lang="en-US" sz="5400" dirty="0" err="1" smtClean="0">
-                <a:solidFill>
-                  <a:srgbClr val="0000E5"/>
-                </a:solidFill>
-                <a:latin typeface="Comic Sans MS"/>
-                <a:cs typeface="Comic Sans MS"/>
-              </a:rPr>
-              <a:t>n</a:t>
-            </a:r>
-            <a:r>
-              <a:rPr lang="en-US" sz="5400" dirty="0" smtClean="0">
-                <a:solidFill>
-                  <a:srgbClr val="0000E5"/>
-                </a:solidFill>
-                <a:latin typeface="Comic Sans MS"/>
-                <a:cs typeface="Comic Sans MS"/>
-              </a:rPr>
-              <a:t>) = 1</a:t>
-            </a:r>
-          </a:p>
-          <a:p>
-            <a:pPr eaLnBrk="1" hangingPunct="1"/>
-            <a:r>
-              <a:rPr lang="en-US" sz="4800" dirty="0" smtClean="0">
-                <a:solidFill>
-                  <a:schemeClr val="tx2"/>
-                </a:solidFill>
-                <a:latin typeface="Comic Sans MS"/>
-                <a:cs typeface="Comic Sans MS"/>
-              </a:rPr>
-              <a:t>if fails, not prime (Fermat)</a:t>
-            </a:r>
-          </a:p>
-          <a:p>
-            <a:pPr eaLnBrk="1" hangingPunct="1"/>
-            <a:r>
-              <a:rPr lang="en-US" sz="4800" dirty="0" smtClean="0">
-                <a:solidFill>
-                  <a:schemeClr val="tx2"/>
-                </a:solidFill>
-                <a:latin typeface="Comic Sans MS"/>
-                <a:cs typeface="Comic Sans MS"/>
-              </a:rPr>
-              <a:t>choose random</a:t>
-            </a:r>
-            <a:r>
-              <a:rPr lang="en-US" sz="4800" dirty="0" smtClean="0">
-                <a:solidFill>
-                  <a:schemeClr val="accent1">
-                    <a:lumMod val="50000"/>
-                  </a:schemeClr>
-                </a:solidFill>
-                <a:latin typeface="Comic Sans MS"/>
-                <a:cs typeface="Comic Sans MS"/>
-              </a:rPr>
-              <a:t> a</a:t>
-            </a:r>
-            <a:r>
-              <a:rPr lang="en-US" sz="4800" dirty="0" smtClean="0">
-                <a:solidFill>
-                  <a:schemeClr val="tx2"/>
-                </a:solidFill>
-                <a:latin typeface="Comic Sans MS"/>
-                <a:cs typeface="Comic Sans MS"/>
-              </a:rPr>
-              <a:t> in</a:t>
-            </a:r>
-            <a:r>
-              <a:rPr lang="en-US" sz="4800" dirty="0" smtClean="0">
-                <a:solidFill>
-                  <a:srgbClr val="0000E5"/>
-                </a:solidFill>
-                <a:latin typeface="Comic Sans MS"/>
-                <a:cs typeface="Comic Sans MS"/>
-              </a:rPr>
-              <a:t> [1,n)</a:t>
-            </a:r>
-            <a:r>
-              <a:rPr lang="en-US" sz="4800" dirty="0" smtClean="0">
-                <a:latin typeface="Comic Sans MS"/>
-                <a:cs typeface="Comic Sans MS"/>
-              </a:rPr>
-              <a:t>.</a:t>
-            </a:r>
-          </a:p>
-          <a:p>
-            <a:pPr eaLnBrk="1" hangingPunct="1"/>
-            <a:r>
-              <a:rPr lang="en-US" sz="4800" dirty="0" smtClean="0">
-                <a:latin typeface="Comic Sans MS"/>
-                <a:cs typeface="Comic Sans MS"/>
-              </a:rPr>
-              <a:t>if not prime, </a:t>
-            </a:r>
-            <a:r>
-              <a:rPr lang="en-US" sz="4800" dirty="0" err="1" smtClean="0">
-                <a:solidFill>
-                  <a:schemeClr val="accent1">
-                    <a:lumMod val="50000"/>
-                  </a:schemeClr>
-                </a:solidFill>
-                <a:latin typeface="Comic Sans MS"/>
-                <a:cs typeface="Comic Sans MS"/>
-              </a:rPr>
-              <a:t>Pr(fails</a:t>
-            </a:r>
-            <a:r>
-              <a:rPr lang="en-US" sz="4800" dirty="0" smtClean="0">
-                <a:solidFill>
-                  <a:schemeClr val="accent1">
-                    <a:lumMod val="50000"/>
-                  </a:schemeClr>
-                </a:solidFill>
-                <a:latin typeface="Comic Sans MS"/>
-                <a:cs typeface="Comic Sans MS"/>
-              </a:rPr>
-              <a:t>)</a:t>
-            </a:r>
-            <a:r>
-              <a:rPr lang="en-US" sz="4800" b="1" dirty="0" smtClean="0">
-                <a:solidFill>
-                  <a:schemeClr val="accent1">
-                    <a:lumMod val="50000"/>
-                  </a:schemeClr>
-                </a:solidFill>
-                <a:latin typeface="Euclid Symbol" charset="2"/>
-                <a:cs typeface="Euclid Symbol" charset="2"/>
-              </a:rPr>
-              <a:t>&gt;</a:t>
-            </a:r>
-            <a:r>
-              <a:rPr lang="en-US" sz="4800" dirty="0" smtClean="0">
-                <a:solidFill>
-                  <a:schemeClr val="accent1">
-                    <a:lumMod val="50000"/>
-                  </a:schemeClr>
-                </a:solidFill>
-                <a:latin typeface="Comic Sans MS"/>
-                <a:cs typeface="Comic Sans MS"/>
-              </a:rPr>
-              <a:t>1/2</a:t>
-            </a:r>
-          </a:p>
-          <a:p>
-            <a:pPr eaLnBrk="1" hangingPunct="1"/>
-            <a:r>
-              <a:rPr lang="en-US" sz="4000" dirty="0" smtClean="0">
-                <a:latin typeface="Comic Sans MS"/>
-                <a:cs typeface="Comic Sans MS"/>
-              </a:rPr>
-              <a:t>(with rare exceptions) </a:t>
-            </a:r>
-          </a:p>
-        </p:txBody>
-      </p:sp>
-    </p:spTree>
-  </p:cSld>
-  <p:clrMapOvr>
-    <a:masterClrMapping/>
-  </p:clrMapOvr>
-  <p:transition xmlns:p14="http://schemas.microsoft.com/office/powerpoint/2010/main" spd="med">
-    <p:fade thruBlk="1"/>
-  </p:transition>
-  <p:timing>
-    <p:tnLst>
-      <p:par>
-        <p:cTn xmlns:p14="http://schemas.microsoft.com/office/powerpoint/2010/main" id="1" dur="indefinite" restart="never" nodeType="tmRoot">
-          <p:childTnLst>
-            <p:seq concurrent="1" nextAc="seek">
-              <p:cTn id="2" dur="indefinite" nodeType="mainSeq">
-                <p:childTnLst>
-                  <p:par>
-                    <p:cTn id="3" fill="hold">
-                      <p:stCondLst>
-                        <p:cond delay="indefinite"/>
-                      </p:stCondLst>
-                      <p:childTnLst>
-                        <p:par>
-                          <p:cTn id="4" fill="hold">
-                            <p:stCondLst>
-                              <p:cond delay="0"/>
-                            </p:stCondLst>
-                            <p:childTnLst>
-                              <p:par>
-                                <p:cTn id="5" presetID="9" presetClass="entr" presetSubtype="0" fill="hold" grpId="0" nodeType="clickEffect">
-                                  <p:stCondLst>
-                                    <p:cond delay="0"/>
-                                  </p:stCondLst>
-                                  <p:childTnLst>
-                                    <p:set>
-                                      <p:cBhvr>
-                                        <p:cTn id="6" dur="1" fill="hold">
-                                          <p:stCondLst>
-                                            <p:cond delay="0"/>
-                                          </p:stCondLst>
-                                        </p:cTn>
-                                        <p:tgtEl>
-                                          <p:spTgt spid="408579">
-                                            <p:txEl>
-                                              <p:pRg st="1" end="1"/>
-                                            </p:txEl>
-                                          </p:spTgt>
-                                        </p:tgtEl>
-                                        <p:attrNameLst>
-                                          <p:attrName>style.visibility</p:attrName>
-                                        </p:attrNameLst>
-                                      </p:cBhvr>
-                                      <p:to>
-                                        <p:strVal val="visible"/>
-                                      </p:to>
-                                    </p:set>
-                                    <p:animEffect transition="in" filter="dissolve">
-                                      <p:cBhvr>
-                                        <p:cTn id="7" dur="500"/>
-                                        <p:tgtEl>
-                                          <p:spTgt spid="408579">
-                                            <p:txEl>
-                                              <p:pRg st="1" end="1"/>
-                                            </p:txEl>
-                                          </p:spTgt>
-                                        </p:tgtEl>
-                                      </p:cBhvr>
-                                    </p:animEffect>
-                                  </p:childTnLst>
-                                </p:cTn>
-                              </p:par>
-                            </p:childTnLst>
-                          </p:cTn>
-                        </p:par>
-                      </p:childTnLst>
-                    </p:cTn>
-                  </p:par>
-                  <p:par>
-                    <p:cTn id="8" fill="hold">
-                      <p:stCondLst>
-                        <p:cond delay="indefinite"/>
-                      </p:stCondLst>
-                      <p:childTnLst>
-                        <p:par>
-                          <p:cTn id="9" fill="hold">
-                            <p:stCondLst>
-                              <p:cond delay="0"/>
-                            </p:stCondLst>
-                            <p:childTnLst>
-                              <p:par>
-                                <p:cTn id="10" presetID="9" presetClass="entr" presetSubtype="0" fill="hold" grpId="0" nodeType="clickEffect">
-                                  <p:stCondLst>
-                                    <p:cond delay="0"/>
-                                  </p:stCondLst>
-                                  <p:childTnLst>
-                                    <p:set>
-                                      <p:cBhvr>
-                                        <p:cTn id="11" dur="1" fill="hold">
-                                          <p:stCondLst>
-                                            <p:cond delay="0"/>
-                                          </p:stCondLst>
-                                        </p:cTn>
-                                        <p:tgtEl>
-                                          <p:spTgt spid="408579">
-                                            <p:txEl>
-                                              <p:pRg st="2" end="2"/>
-                                            </p:txEl>
-                                          </p:spTgt>
-                                        </p:tgtEl>
-                                        <p:attrNameLst>
-                                          <p:attrName>style.visibility</p:attrName>
-                                        </p:attrNameLst>
-                                      </p:cBhvr>
-                                      <p:to>
-                                        <p:strVal val="visible"/>
-                                      </p:to>
-                                    </p:set>
-                                    <p:animEffect transition="in" filter="dissolve">
-                                      <p:cBhvr>
-                                        <p:cTn id="12" dur="500"/>
-                                        <p:tgtEl>
-                                          <p:spTgt spid="408579">
-                                            <p:txEl>
-                                              <p:pRg st="2" end="2"/>
-                                            </p:txEl>
-                                          </p:spTgt>
-                                        </p:tgtEl>
-                                      </p:cBhvr>
-                                    </p:animEffect>
-                                  </p:childTnLst>
-                                </p:cTn>
-                              </p:par>
-                            </p:childTnLst>
-                          </p:cTn>
-                        </p:par>
-                      </p:childTnLst>
-                    </p:cTn>
-                  </p:par>
-                  <p:par>
-                    <p:cTn id="13" fill="hold">
-                      <p:stCondLst>
-                        <p:cond delay="indefinite"/>
-                      </p:stCondLst>
-                      <p:childTnLst>
-                        <p:par>
-                          <p:cTn id="14" fill="hold">
-                            <p:stCondLst>
-                              <p:cond delay="0"/>
-                            </p:stCondLst>
-                            <p:childTnLst>
-                              <p:par>
-                                <p:cTn id="15" presetID="9" presetClass="entr" presetSubtype="0" fill="hold" grpId="0" nodeType="clickEffect">
-                                  <p:stCondLst>
-                                    <p:cond delay="0"/>
-                                  </p:stCondLst>
-                                  <p:childTnLst>
-                                    <p:set>
-                                      <p:cBhvr>
-                                        <p:cTn id="16" dur="1" fill="hold">
-                                          <p:stCondLst>
-                                            <p:cond delay="0"/>
-                                          </p:stCondLst>
-                                        </p:cTn>
-                                        <p:tgtEl>
-                                          <p:spTgt spid="408579">
-                                            <p:txEl>
-                                              <p:pRg st="3" end="3"/>
-                                            </p:txEl>
-                                          </p:spTgt>
-                                        </p:tgtEl>
-                                        <p:attrNameLst>
-                                          <p:attrName>style.visibility</p:attrName>
-                                        </p:attrNameLst>
-                                      </p:cBhvr>
-                                      <p:to>
-                                        <p:strVal val="visible"/>
-                                      </p:to>
-                                    </p:set>
-                                    <p:animEffect transition="in" filter="dissolve">
-                                      <p:cBhvr>
-                                        <p:cTn id="17" dur="500"/>
-                                        <p:tgtEl>
-                                          <p:spTgt spid="408579">
-                                            <p:txEl>
-                                              <p:pRg st="3" end="3"/>
-                                            </p:txEl>
-                                          </p:spTgt>
-                                        </p:tgtEl>
-                                      </p:cBhvr>
-                                    </p:animEffect>
-                                  </p:childTnLst>
-                                </p:cTn>
-                              </p:par>
-                            </p:childTnLst>
-                          </p:cTn>
-                        </p:par>
-                      </p:childTnLst>
-                    </p:cTn>
-                  </p:par>
-                  <p:par>
-                    <p:cTn id="18" fill="hold">
-                      <p:stCondLst>
-                        <p:cond delay="indefinite"/>
-                      </p:stCondLst>
-                      <p:childTnLst>
-                        <p:par>
-                          <p:cTn id="19" fill="hold">
-                            <p:stCondLst>
-                              <p:cond delay="0"/>
-                            </p:stCondLst>
-                            <p:childTnLst>
-                              <p:par>
-                                <p:cTn id="20" presetID="9" presetClass="entr" presetSubtype="0" fill="hold" grpId="0" nodeType="clickEffect">
-                                  <p:stCondLst>
-                                    <p:cond delay="0"/>
-                                  </p:stCondLst>
-                                  <p:childTnLst>
-                                    <p:set>
-                                      <p:cBhvr>
-                                        <p:cTn id="21" dur="1" fill="hold">
-                                          <p:stCondLst>
-                                            <p:cond delay="0"/>
-                                          </p:stCondLst>
-                                        </p:cTn>
-                                        <p:tgtEl>
-                                          <p:spTgt spid="408579">
-                                            <p:txEl>
-                                              <p:pRg st="4" end="4"/>
-                                            </p:txEl>
-                                          </p:spTgt>
-                                        </p:tgtEl>
-                                        <p:attrNameLst>
-                                          <p:attrName>style.visibility</p:attrName>
-                                        </p:attrNameLst>
-                                      </p:cBhvr>
-                                      <p:to>
-                                        <p:strVal val="visible"/>
-                                      </p:to>
-                                    </p:set>
-                                    <p:animEffect transition="in" filter="dissolve">
-                                      <p:cBhvr>
-                                        <p:cTn id="22" dur="500"/>
-                                        <p:tgtEl>
-                                          <p:spTgt spid="408579">
-                                            <p:txEl>
-                                              <p:pRg st="4" end="4"/>
-                                            </p:txEl>
-                                          </p:spTgt>
-                                        </p:tgtEl>
-                                      </p:cBhvr>
-                                    </p:animEffect>
-                                  </p:childTnLst>
-                                </p:cTn>
-                              </p:par>
-                            </p:childTnLst>
-                          </p:cTn>
-                        </p:par>
-                        <p:par>
-                          <p:cTn id="23" fill="hold">
-                            <p:stCondLst>
-                              <p:cond delay="500"/>
-                            </p:stCondLst>
-                            <p:childTnLst>
-                              <p:par>
-                                <p:cTn id="24" presetID="9" presetClass="entr" presetSubtype="0" fill="hold" grpId="0" nodeType="afterEffect">
-                                  <p:stCondLst>
-                                    <p:cond delay="0"/>
-                                  </p:stCondLst>
-                                  <p:childTnLst>
-                                    <p:set>
-                                      <p:cBhvr>
-                                        <p:cTn id="25" dur="1" fill="hold">
-                                          <p:stCondLst>
-                                            <p:cond delay="0"/>
-                                          </p:stCondLst>
-                                        </p:cTn>
-                                        <p:tgtEl>
-                                          <p:spTgt spid="408579">
-                                            <p:txEl>
-                                              <p:pRg st="5" end="5"/>
-                                            </p:txEl>
-                                          </p:spTgt>
-                                        </p:tgtEl>
-                                        <p:attrNameLst>
-                                          <p:attrName>style.visibility</p:attrName>
-                                        </p:attrNameLst>
-                                      </p:cBhvr>
-                                      <p:to>
-                                        <p:strVal val="visible"/>
-                                      </p:to>
-                                    </p:set>
-                                    <p:animEffect transition="in" filter="dissolve">
-                                      <p:cBhvr>
-                                        <p:cTn id="26" dur="500"/>
-                                        <p:tgtEl>
-                                          <p:spTgt spid="408579">
-                                            <p:txEl>
-                                              <p:pRg st="5" end="5"/>
-                                            </p:txEl>
-                                          </p:spTgt>
-                                        </p:tgtEl>
-                                      </p:cBhvr>
-                                    </p:animEffect>
-                                  </p:childTnLst>
-                                </p:cTn>
-                              </p:par>
-                            </p:childTnLst>
-                          </p:cTn>
-                        </p:par>
-                      </p:childTnLst>
-                    </p:cTn>
-                  </p:par>
-                </p:childTnLst>
-              </p:cTn>
-              <p:prevCondLst>
-                <p:cond evt="onPrev" delay="0">
-                  <p:tgtEl>
-                    <p:sldTgt/>
-                  </p:tgtEl>
-                </p:cond>
-              </p:prevCondLst>
-              <p:nextCondLst>
-                <p:cond evt="onNext" delay="0">
-                  <p:tgtEl>
-                    <p:sldTgt/>
-                  </p:tgtEl>
-                </p:cond>
-              </p:nextCondLst>
-            </p:seq>
-          </p:childTnLst>
-        </p:cTn>
-      </p:par>
-    </p:tnLst>
-    <p:bldLst>
-      <p:bldP spid="408579" grpId="0" uiExpand="1" build="p"/>
-    </p:bldLst>
-  </p:timing>
-</p:sld>
-</file>
-
-<file path=ppt/slides/slide9.xml><?xml version="1.0" encoding="utf-8"?>
-<p:sld xmlns:a="http://schemas.openxmlformats.org/drawingml/2006/main" xmlns:r="http://schemas.openxmlformats.org/officeDocument/2006/relationships" xmlns:p="http://schemas.openxmlformats.org/presentationml/2006/main">
-  <p:cSld>
-    <p:spTree>
-      <p:nvGrpSpPr>
-        <p:cNvPr id="1" name=""/>
-        <p:cNvGrpSpPr/>
-        <p:nvPr/>
-      </p:nvGrpSpPr>
-      <p:grpSpPr>
-        <a:xfrm>
-          <a:off x="0" y="0"/>
-          <a:ext cx="0" cy="0"/>
-          <a:chOff x="0" y="0"/>
-          <a:chExt cx="0" cy="0"/>
-        </a:xfrm>
-      </p:grpSpPr>
-      <p:sp>
-        <p:nvSpPr>
-          <p:cNvPr id="4" name="Slide Number Placeholder 3"/>
-          <p:cNvSpPr>
-            <a:spLocks noGrp="1"/>
-          </p:cNvSpPr>
-          <p:nvPr>
-            <p:ph type="sldNum" sz="quarter" idx="4"/>
-          </p:nvPr>
-        </p:nvSpPr>
-        <p:spPr>
-          <a:xfrm>
-            <a:off x="6477000" y="6553200"/>
-            <a:ext cx="2667000" cy="307777"/>
-          </a:xfrm>
-        </p:spPr>
-        <p:txBody>
-          <a:bodyPr/>
-          <a:lstStyle/>
-          <a:p>
-            <a:pPr>
-              <a:defRPr/>
-            </a:pPr>
-            <a:r>
-              <a:rPr lang="en-US" dirty="0" err="1" smtClean="0"/>
-              <a:t>lec</a:t>
-            </a:r>
-            <a:r>
-              <a:rPr lang="en-US" dirty="0" smtClean="0"/>
-              <a:t> 6M.</a:t>
-            </a:r>
-            <a:fld id="{3C84E341-AEF3-493B-A8EE-DBBF671E8583}" type="slidenum">
-              <a:rPr lang="en-US" smtClean="0"/>
-              <a:pPr>
-                <a:defRPr/>
-              </a:pPr>
-              <a:t>9</a:t>
-            </a:fld>
-            <a:endParaRPr lang="en-US" dirty="0"/>
-          </a:p>
-        </p:txBody>
-      </p:sp>
-      <p:sp>
-        <p:nvSpPr>
-          <p:cNvPr id="18435" name="Rectangle 2"/>
-          <p:cNvSpPr>
-            <a:spLocks noGrp="1" noChangeArrowheads="1"/>
-          </p:cNvSpPr>
-          <p:nvPr>
-            <p:ph type="title"/>
-          </p:nvPr>
-        </p:nvSpPr>
-        <p:spPr/>
-        <p:txBody>
-          <a:bodyPr/>
-          <a:lstStyle/>
-          <a:p>
-            <a:pPr eaLnBrk="1" hangingPunct="1"/>
-            <a:r>
-              <a:rPr lang="en-US" sz="4800" smtClean="0"/>
-              <a:t>Why does this work?</a:t>
-            </a:r>
-          </a:p>
-        </p:txBody>
-      </p:sp>
-      <p:sp>
-        <p:nvSpPr>
-          <p:cNvPr id="35844" name="Rectangle 4"/>
-          <p:cNvSpPr>
-            <a:spLocks noGrp="1" noChangeArrowheads="1"/>
-          </p:cNvSpPr>
-          <p:nvPr>
-            <p:ph type="body" idx="1"/>
-          </p:nvPr>
-        </p:nvSpPr>
-        <p:spPr>
-          <a:xfrm>
-            <a:off x="533400" y="1600200"/>
-            <a:ext cx="8026400" cy="3505200"/>
-          </a:xfrm>
-        </p:spPr>
-        <p:txBody>
-          <a:bodyPr/>
-          <a:lstStyle/>
-          <a:p>
-            <a:pPr eaLnBrk="1" hangingPunct="1">
-              <a:buFontTx/>
-              <a:buNone/>
-              <a:defRPr/>
-            </a:pPr>
-            <a:r>
-              <a:rPr lang="en-US" sz="6000" dirty="0" smtClean="0"/>
-              <a:t>follows easily from </a:t>
-            </a:r>
-          </a:p>
-          <a:p>
-            <a:pPr eaLnBrk="1" hangingPunct="1">
-              <a:buFontTx/>
-              <a:buNone/>
-              <a:defRPr/>
-            </a:pPr>
-            <a:r>
-              <a:rPr lang="en-US" sz="6000" dirty="0" smtClean="0"/>
-              <a:t>Euler’s Theorem when</a:t>
-            </a:r>
-          </a:p>
-          <a:p>
-            <a:pPr eaLnBrk="1" hangingPunct="1">
-              <a:buFontTx/>
-              <a:buNone/>
-              <a:defRPr/>
-            </a:pPr>
-            <a:r>
-              <a:rPr lang="en-US" sz="6000" dirty="0" smtClean="0">
-                <a:solidFill>
-                  <a:schemeClr val="accent5">
-                    <a:lumMod val="50000"/>
-                  </a:schemeClr>
-                </a:solidFill>
-              </a:rPr>
-              <a:t>m</a:t>
-            </a:r>
-            <a:r>
-              <a:rPr lang="en-US" sz="6000" dirty="0" smtClean="0"/>
-              <a:t> has inverse mod </a:t>
-            </a:r>
-            <a:r>
-              <a:rPr lang="en-US" sz="6000" dirty="0" smtClean="0">
-                <a:solidFill>
-                  <a:schemeClr val="accent5">
-                    <a:lumMod val="50000"/>
-                  </a:schemeClr>
-                </a:solidFill>
-              </a:rPr>
-              <a:t>n</a:t>
-            </a:r>
-            <a:r>
-              <a:rPr lang="en-US" sz="6000" dirty="0" smtClean="0"/>
-              <a:t> </a:t>
-            </a:r>
-          </a:p>
-        </p:txBody>
-      </p:sp>
-    </p:spTree>
-  </p:cSld>
-  <p:clrMapOvr>
-    <a:masterClrMapping/>
-  </p:clrMapOvr>
-  <p:transition xmlns:p14="http://schemas.microsoft.com/office/powerpoint/2010/main">
-    <p:fade/>
-  </p:transition>
-  <p:timing>
-    <p:tnLst>
-      <p:par>
-        <p:cTn xmlns:p14="http://schemas.microsoft.com/office/powerpoint/2010/main" id="1" dur="indefinite" restart="never" nodeType="tmRoot"/>
-      </p:par>
-    </p:tnLst>
   </p:timing>
 </p:sld>
 </file>

</xml_diff>

<commit_message>
CP_totient_for_pq and cp6f edits; typos/format: PS_Catalan_numbers_meyer_version, PS_prime_polynomial_41 CP_swapping_quantifiers PS_faster_adder_logic
</commit_message>
<xml_diff>
--- a/fall11/slidesF11/slides6f.pptx
+++ b/fall11/slidesF11/slides6f.pptx
@@ -5,10 +5,10 @@
     <p:sldMasterId id="2147483678" r:id="rId1"/>
   </p:sldMasterIdLst>
   <p:notesMasterIdLst>
-    <p:notesMasterId r:id="rId26"/>
+    <p:notesMasterId r:id="rId25"/>
   </p:notesMasterIdLst>
   <p:handoutMasterIdLst>
-    <p:handoutMasterId r:id="rId27"/>
+    <p:handoutMasterId r:id="rId26"/>
   </p:handoutMasterIdLst>
   <p:sldIdLst>
     <p:sldId id="388" r:id="rId2"/>
@@ -34,12 +34,11 @@
     <p:sldId id="438" r:id="rId22"/>
     <p:sldId id="402" r:id="rId23"/>
     <p:sldId id="439" r:id="rId24"/>
-    <p:sldId id="424" r:id="rId25"/>
   </p:sldIdLst>
   <p:sldSz cx="9144000" cy="6858000" type="screen4x3"/>
   <p:notesSz cx="7315200" cy="9601200"/>
   <p:custDataLst>
-    <p:tags r:id="rId29"/>
+    <p:tags r:id="rId28"/>
   </p:custDataLst>
   <p:defaultTextStyle>
     <a:defPPr>
@@ -2250,15 +2249,7 @@
             </a:r>
             <a:r>
               <a:rPr lang="en-US" sz="1200" dirty="0" smtClean="0"/>
-              <a:t> </a:t>
-            </a:r>
-            <a:r>
-              <a:rPr lang="en-US" sz="1200" dirty="0" smtClean="0"/>
-              <a:t>6F.‹</a:t>
-            </a:r>
-            <a:r>
-              <a:rPr lang="en-US" sz="1200" dirty="0" smtClean="0"/>
-              <a:t>#›</a:t>
+              <a:t> 6F.‹#›</a:t>
             </a:r>
             <a:endParaRPr lang="en-US" sz="1200" dirty="0"/>
           </a:p>
@@ -2429,15 +2420,7 @@
             </a:r>
             <a:r>
               <a:rPr lang="en-US" sz="1200" dirty="0" smtClean="0"/>
-              <a:t> </a:t>
-            </a:r>
-            <a:r>
-              <a:rPr lang="en-US" sz="1200" dirty="0" smtClean="0"/>
-              <a:t>6F.‹</a:t>
-            </a:r>
-            <a:r>
-              <a:rPr lang="en-US" sz="1200" dirty="0" smtClean="0"/>
-              <a:t>#›</a:t>
+              <a:t> 6F.‹#›</a:t>
             </a:r>
             <a:endParaRPr lang="en-US" sz="1200" dirty="0"/>
           </a:p>
@@ -2626,15 +2609,7 @@
             </a:r>
             <a:r>
               <a:rPr lang="en-US" sz="1200" dirty="0" smtClean="0"/>
-              <a:t> </a:t>
-            </a:r>
-            <a:r>
-              <a:rPr lang="en-US" sz="1200" dirty="0" smtClean="0"/>
-              <a:t>6F.‹</a:t>
-            </a:r>
-            <a:r>
-              <a:rPr lang="en-US" sz="1200" dirty="0" smtClean="0"/>
-              <a:t>#›</a:t>
+              <a:t> 6F.‹#›</a:t>
             </a:r>
             <a:endParaRPr lang="en-US" sz="1200" dirty="0"/>
           </a:p>
@@ -2729,11 +2704,7 @@
             </a:r>
             <a:r>
               <a:rPr lang="en-US" dirty="0" smtClean="0"/>
-              <a:t> </a:t>
-            </a:r>
-            <a:r>
-              <a:rPr lang="en-US" dirty="0" smtClean="0"/>
-              <a:t>6F.</a:t>
+              <a:t> 6F.</a:t>
             </a:r>
             <a:fld id="{092F4601-307B-4C24-B8E1-0927D73A950D}" type="slidenum">
               <a:rPr lang="en-US" smtClean="0"/>
@@ -2954,11 +2925,7 @@
             </a:r>
             <a:r>
               <a:rPr lang="en-US" dirty="0" smtClean="0"/>
-              <a:t> </a:t>
-            </a:r>
-            <a:r>
-              <a:rPr lang="en-US" dirty="0" smtClean="0"/>
-              <a:t>6F.</a:t>
+              <a:t> 6F.</a:t>
             </a:r>
             <a:fld id="{7C4E6977-E764-49C2-9B46-F1F7E8372AF3}" type="slidenum">
               <a:rPr lang="en-US" smtClean="0"/>
@@ -3033,11 +3000,7 @@
             </a:r>
             <a:r>
               <a:rPr lang="en-US" dirty="0" smtClean="0"/>
-              <a:t> </a:t>
-            </a:r>
-            <a:r>
-              <a:rPr lang="en-US" dirty="0" smtClean="0"/>
-              <a:t>6F.</a:t>
+              <a:t> 6F.</a:t>
             </a:r>
             <a:fld id="{662DA84E-2EE0-4520-81DD-FF87E285B2C7}" type="slidenum">
               <a:rPr lang="en-US" smtClean="0"/>
@@ -3288,15 +3251,7 @@
             </a:r>
             <a:r>
               <a:rPr lang="en-US" sz="1200" dirty="0" smtClean="0"/>
-              <a:t> </a:t>
-            </a:r>
-            <a:r>
-              <a:rPr lang="en-US" sz="1200" dirty="0" smtClean="0"/>
-              <a:t>6F.</a:t>
-            </a:r>
-            <a:r>
-              <a:rPr lang="en-US" sz="1200" dirty="0" smtClean="0"/>
-              <a:t>‹#›</a:t>
+              <a:t> 6F.‹#›</a:t>
             </a:r>
             <a:endParaRPr lang="en-US" sz="1200" dirty="0"/>
           </a:p>
@@ -3353,37 +3308,7 @@
                 <a:uFillTx/>
                 <a:latin typeface="Comic Sans MS" pitchFamily="66" charset="0"/>
               </a:rPr>
-              <a:t>Albert R Meyer         </a:t>
-            </a:r>
-            <a:r>
-              <a:rPr kumimoji="0" lang="en-US" sz="1200" b="0" i="0" u="none" strike="noStrike" kern="1200" cap="none" spc="0" normalizeH="0" baseline="0" noProof="0" dirty="0" smtClean="0">
-                <a:ln>
-                  <a:noFill/>
-                </a:ln>
-                <a:solidFill>
-                  <a:schemeClr val="tx1"/>
-                </a:solidFill>
-                <a:effectLst/>
-                <a:uLnTx/>
-                <a:uFillTx/>
-                <a:latin typeface="Comic Sans MS" pitchFamily="66" charset="0"/>
-              </a:rPr>
-              <a:t>October 14, </a:t>
-            </a:r>
-            <a:r>
-              <a:rPr kumimoji="0" lang="en-US" sz="1200" b="0" i="0" u="none" strike="noStrike" kern="1200" cap="none" spc="0" normalizeH="0" baseline="0" noProof="0" dirty="0" smtClean="0">
-                <a:ln>
-                  <a:noFill/>
-                </a:ln>
-                <a:solidFill>
-                  <a:schemeClr val="tx1"/>
-                </a:solidFill>
-                <a:effectLst/>
-                <a:uLnTx/>
-                <a:uFillTx/>
-                <a:latin typeface="Comic Sans MS" pitchFamily="66" charset="0"/>
-              </a:rPr>
-              <a:t>2011</a:t>
+              <a:t>Albert R Meyer         October 14, 2011</a:t>
             </a:r>
             <a:endParaRPr kumimoji="0" lang="en-US" sz="1200" b="0" i="0" u="none" strike="noStrike" kern="1200" cap="none" spc="0" normalizeH="0" baseline="0" noProof="0" dirty="0">
               <a:ln>
@@ -3858,11 +3783,7 @@
             </a:r>
             <a:r>
               <a:rPr lang="en-US" dirty="0" smtClean="0"/>
-              <a:t> </a:t>
-            </a:r>
-            <a:r>
-              <a:rPr lang="en-US" dirty="0" smtClean="0"/>
-              <a:t>6F.</a:t>
+              <a:t> 6F.</a:t>
             </a:r>
             <a:fld id="{F969F519-7538-4B74-8C91-7BCC0BE33C8C}" type="slidenum">
               <a:rPr lang="en-US" smtClean="0"/>
@@ -3998,7 +3919,7 @@
 </file>
 
 <file path=ppt/slides/slide10.xml><?xml version="1.0" encoding="utf-8"?>
-<p:sld xmlns:a="http://schemas.openxmlformats.org/drawingml/2006/main" xmlns:r="http://schemas.openxmlformats.org/officeDocument/2006/relationships" xmlns:p="http://schemas.openxmlformats.org/presentationml/2006/main">
+<p:sld xmlns:a="http://schemas.openxmlformats.org/drawingml/2006/main" xmlns:r="http://schemas.openxmlformats.org/officeDocument/2006/relationships" xmlns:p="http://schemas.openxmlformats.org/presentationml/2006/main" show="0">
   <p:cSld>
     <p:spTree>
       <p:nvGrpSpPr>
@@ -4043,11 +3964,7 @@
             </a:r>
             <a:r>
               <a:rPr lang="en-US" dirty="0" smtClean="0"/>
-              <a:t> </a:t>
-            </a:r>
-            <a:r>
-              <a:rPr lang="en-US" dirty="0" smtClean="0"/>
-              <a:t>6F.</a:t>
+              <a:t> 6F.</a:t>
             </a:r>
             <a:fld id="{6A5E9C01-C108-4A5C-AE7A-FB77D488E7D9}" type="slidenum">
               <a:rPr lang="en-US" smtClean="0"/>
@@ -4703,11 +4620,7 @@
             </a:r>
             <a:r>
               <a:rPr lang="en-US" dirty="0" smtClean="0"/>
-              <a:t> </a:t>
-            </a:r>
-            <a:r>
-              <a:rPr lang="en-US" dirty="0" smtClean="0"/>
-              <a:t>6F.</a:t>
+              <a:t> 6F.</a:t>
             </a:r>
             <a:fld id="{F389C0C6-D6B8-4BCF-9EE6-7CFCBB0EDCA3}" type="slidenum">
               <a:rPr lang="en-US" smtClean="0"/>
@@ -5263,7 +5176,7 @@
 </file>
 
 <file path=ppt/slides/slide12.xml><?xml version="1.0" encoding="utf-8"?>
-<p:sld xmlns:a="http://schemas.openxmlformats.org/drawingml/2006/main" xmlns:r="http://schemas.openxmlformats.org/officeDocument/2006/relationships" xmlns:p="http://schemas.openxmlformats.org/presentationml/2006/main">
+<p:sld xmlns:a="http://schemas.openxmlformats.org/drawingml/2006/main" xmlns:r="http://schemas.openxmlformats.org/officeDocument/2006/relationships" xmlns:p="http://schemas.openxmlformats.org/presentationml/2006/main" show="0">
   <p:cSld>
     <p:spTree>
       <p:nvGrpSpPr>
@@ -5330,15 +5243,7 @@
             </a:r>
             <a:r>
               <a:rPr lang="en-US" sz="1200" dirty="0" smtClean="0"/>
-              <a:t> </a:t>
-            </a:r>
-            <a:r>
-              <a:rPr lang="en-US" sz="1200" dirty="0" smtClean="0"/>
-              <a:t>6F.‹</a:t>
-            </a:r>
-            <a:r>
-              <a:rPr lang="en-US" sz="1200" dirty="0" smtClean="0"/>
-              <a:t>#›</a:t>
+              <a:t> 6F.‹#›</a:t>
             </a:r>
             <a:endParaRPr lang="en-US" sz="1200" dirty="0"/>
           </a:p>
@@ -6659,7 +6564,7 @@
 </file>
 
 <file path=ppt/slides/slide13.xml><?xml version="1.0" encoding="utf-8"?>
-<p:sld xmlns:a="http://schemas.openxmlformats.org/drawingml/2006/main" xmlns:r="http://schemas.openxmlformats.org/officeDocument/2006/relationships" xmlns:p="http://schemas.openxmlformats.org/presentationml/2006/main">
+<p:sld xmlns:a="http://schemas.openxmlformats.org/drawingml/2006/main" xmlns:r="http://schemas.openxmlformats.org/officeDocument/2006/relationships" xmlns:p="http://schemas.openxmlformats.org/presentationml/2006/main" show="0">
   <p:cSld>
     <p:spTree>
       <p:nvGrpSpPr>
@@ -6726,15 +6631,7 @@
             </a:r>
             <a:r>
               <a:rPr lang="en-US" sz="1200" dirty="0" smtClean="0"/>
-              <a:t> </a:t>
-            </a:r>
-            <a:r>
-              <a:rPr lang="en-US" sz="1200" dirty="0" smtClean="0"/>
-              <a:t>6F.‹</a:t>
-            </a:r>
-            <a:r>
-              <a:rPr lang="en-US" sz="1200" dirty="0" smtClean="0"/>
-              <a:t>#›</a:t>
+              <a:t> 6F.‹#›</a:t>
             </a:r>
             <a:endParaRPr lang="en-US" sz="1200" dirty="0"/>
           </a:p>
@@ -8099,15 +7996,7 @@
             </a:r>
             <a:r>
               <a:rPr lang="en-US" sz="1200" dirty="0" smtClean="0"/>
-              <a:t> </a:t>
-            </a:r>
-            <a:r>
-              <a:rPr lang="en-US" sz="1200" dirty="0" smtClean="0"/>
-              <a:t>6F.‹</a:t>
-            </a:r>
-            <a:r>
-              <a:rPr lang="en-US" sz="1200" dirty="0" smtClean="0"/>
-              <a:t>#›</a:t>
+              <a:t> 6F.‹#›</a:t>
             </a:r>
             <a:endParaRPr lang="en-US" sz="1200" dirty="0"/>
           </a:p>
@@ -9696,7 +9585,7 @@
 </file>
 
 <file path=ppt/slides/slide15.xml><?xml version="1.0" encoding="utf-8"?>
-<p:sld xmlns:a="http://schemas.openxmlformats.org/drawingml/2006/main" xmlns:r="http://schemas.openxmlformats.org/officeDocument/2006/relationships" xmlns:p="http://schemas.openxmlformats.org/presentationml/2006/main">
+<p:sld xmlns:a="http://schemas.openxmlformats.org/drawingml/2006/main" xmlns:r="http://schemas.openxmlformats.org/officeDocument/2006/relationships" xmlns:p="http://schemas.openxmlformats.org/presentationml/2006/main" show="0">
   <p:cSld>
     <p:spTree>
       <p:nvGrpSpPr>
@@ -9763,15 +9652,7 @@
             </a:r>
             <a:r>
               <a:rPr lang="en-US" sz="1200" dirty="0" smtClean="0"/>
-              <a:t> </a:t>
-            </a:r>
-            <a:r>
-              <a:rPr lang="en-US" sz="1200" dirty="0" smtClean="0"/>
-              <a:t>6F.‹</a:t>
-            </a:r>
-            <a:r>
-              <a:rPr lang="en-US" sz="1200" dirty="0" smtClean="0"/>
-              <a:t>#›</a:t>
+              <a:t> 6F.‹#›</a:t>
             </a:r>
             <a:endParaRPr lang="en-US" sz="1200" dirty="0"/>
           </a:p>
@@ -11444,7 +11325,7 @@
 </file>
 
 <file path=ppt/slides/slide16.xml><?xml version="1.0" encoding="utf-8"?>
-<p:sld xmlns:a="http://schemas.openxmlformats.org/drawingml/2006/main" xmlns:r="http://schemas.openxmlformats.org/officeDocument/2006/relationships" xmlns:p="http://schemas.openxmlformats.org/presentationml/2006/main">
+<p:sld xmlns:a="http://schemas.openxmlformats.org/drawingml/2006/main" xmlns:r="http://schemas.openxmlformats.org/officeDocument/2006/relationships" xmlns:p="http://schemas.openxmlformats.org/presentationml/2006/main" show="0">
   <p:cSld>
     <p:spTree>
       <p:nvGrpSpPr>
@@ -11511,15 +11392,7 @@
             </a:r>
             <a:r>
               <a:rPr lang="en-US" sz="1200" dirty="0" smtClean="0"/>
-              <a:t> </a:t>
-            </a:r>
-            <a:r>
-              <a:rPr lang="en-US" sz="1200" dirty="0" smtClean="0"/>
-              <a:t>6F.‹</a:t>
-            </a:r>
-            <a:r>
-              <a:rPr lang="en-US" sz="1200" dirty="0" smtClean="0"/>
-              <a:t>#›</a:t>
+              <a:t> 6F.‹#›</a:t>
             </a:r>
             <a:endParaRPr lang="en-US" sz="1200" dirty="0"/>
           </a:p>
@@ -13078,7 +12951,7 @@
 </file>
 
 <file path=ppt/slides/slide17.xml><?xml version="1.0" encoding="utf-8"?>
-<p:sld xmlns:a="http://schemas.openxmlformats.org/drawingml/2006/main" xmlns:r="http://schemas.openxmlformats.org/officeDocument/2006/relationships" xmlns:p="http://schemas.openxmlformats.org/presentationml/2006/main">
+<p:sld xmlns:a="http://schemas.openxmlformats.org/drawingml/2006/main" xmlns:r="http://schemas.openxmlformats.org/officeDocument/2006/relationships" xmlns:p="http://schemas.openxmlformats.org/presentationml/2006/main" show="0">
   <p:cSld>
     <p:spTree>
       <p:nvGrpSpPr>
@@ -13145,15 +13018,7 @@
             </a:r>
             <a:r>
               <a:rPr lang="en-US" sz="1200" dirty="0" smtClean="0"/>
-              <a:t> </a:t>
-            </a:r>
-            <a:r>
-              <a:rPr lang="en-US" sz="1200" dirty="0" smtClean="0"/>
-              <a:t>6F.‹</a:t>
-            </a:r>
-            <a:r>
-              <a:rPr lang="en-US" sz="1200" dirty="0" smtClean="0"/>
-              <a:t>#›</a:t>
+              <a:t> 6F.‹#›</a:t>
             </a:r>
             <a:endParaRPr lang="en-US" sz="1200" dirty="0"/>
           </a:p>
@@ -14875,7 +14740,7 @@
 </file>
 
 <file path=ppt/slides/slide18.xml><?xml version="1.0" encoding="utf-8"?>
-<p:sld xmlns:a="http://schemas.openxmlformats.org/drawingml/2006/main" xmlns:r="http://schemas.openxmlformats.org/officeDocument/2006/relationships" xmlns:p="http://schemas.openxmlformats.org/presentationml/2006/main">
+<p:sld xmlns:a="http://schemas.openxmlformats.org/drawingml/2006/main" xmlns:r="http://schemas.openxmlformats.org/officeDocument/2006/relationships" xmlns:p="http://schemas.openxmlformats.org/presentationml/2006/main" show="0">
   <p:cSld>
     <p:spTree>
       <p:nvGrpSpPr>
@@ -14942,15 +14807,7 @@
             </a:r>
             <a:r>
               <a:rPr lang="en-US" sz="1200" dirty="0" smtClean="0"/>
-              <a:t> </a:t>
-            </a:r>
-            <a:r>
-              <a:rPr lang="en-US" sz="1200" dirty="0" smtClean="0"/>
-              <a:t>6F.‹</a:t>
-            </a:r>
-            <a:r>
-              <a:rPr lang="en-US" sz="1200" dirty="0" smtClean="0"/>
-              <a:t>#›</a:t>
+              <a:t> 6F.‹#›</a:t>
             </a:r>
             <a:endParaRPr lang="en-US" sz="1200" dirty="0"/>
           </a:p>
@@ -16509,7 +16366,7 @@
 </file>
 
 <file path=ppt/slides/slide19.xml><?xml version="1.0" encoding="utf-8"?>
-<p:sld xmlns:a="http://schemas.openxmlformats.org/drawingml/2006/main" xmlns:r="http://schemas.openxmlformats.org/officeDocument/2006/relationships" xmlns:p="http://schemas.openxmlformats.org/presentationml/2006/main">
+<p:sld xmlns:a="http://schemas.openxmlformats.org/drawingml/2006/main" xmlns:r="http://schemas.openxmlformats.org/officeDocument/2006/relationships" xmlns:p="http://schemas.openxmlformats.org/presentationml/2006/main" show="0">
   <p:cSld>
     <p:spTree>
       <p:nvGrpSpPr>
@@ -16576,15 +16433,7 @@
             </a:r>
             <a:r>
               <a:rPr lang="en-US" sz="1200" dirty="0" smtClean="0"/>
-              <a:t> </a:t>
-            </a:r>
-            <a:r>
-              <a:rPr lang="en-US" sz="1200" dirty="0" smtClean="0"/>
-              <a:t>6F.‹</a:t>
-            </a:r>
-            <a:r>
-              <a:rPr lang="en-US" sz="1200" dirty="0" smtClean="0"/>
-              <a:t>#›</a:t>
+              <a:t> 6F.‹#›</a:t>
             </a:r>
             <a:endParaRPr lang="en-US" sz="1200" dirty="0"/>
           </a:p>
@@ -18188,11 +18037,7 @@
             </a:r>
             <a:r>
               <a:rPr lang="en-US" dirty="0" smtClean="0"/>
-              <a:t> </a:t>
-            </a:r>
-            <a:r>
-              <a:rPr lang="en-US" dirty="0" smtClean="0"/>
-              <a:t>6F.</a:t>
+              <a:t> 6F.</a:t>
             </a:r>
             <a:fld id="{03D159E7-7261-456C-B1C2-8B1BCE6FD8AA}" type="slidenum">
               <a:rPr lang="en-US" smtClean="0"/>
@@ -18272,7 +18117,7 @@
 </file>
 
 <file path=ppt/slides/slide20.xml><?xml version="1.0" encoding="utf-8"?>
-<p:sld xmlns:a="http://schemas.openxmlformats.org/drawingml/2006/main" xmlns:r="http://schemas.openxmlformats.org/officeDocument/2006/relationships" xmlns:p="http://schemas.openxmlformats.org/presentationml/2006/main">
+<p:sld xmlns:a="http://schemas.openxmlformats.org/drawingml/2006/main" xmlns:r="http://schemas.openxmlformats.org/officeDocument/2006/relationships" xmlns:p="http://schemas.openxmlformats.org/presentationml/2006/main" show="0">
   <p:cSld>
     <p:spTree>
       <p:nvGrpSpPr>
@@ -18339,15 +18184,7 @@
             </a:r>
             <a:r>
               <a:rPr lang="en-US" sz="1200" dirty="0" smtClean="0"/>
-              <a:t> </a:t>
-            </a:r>
-            <a:r>
-              <a:rPr lang="en-US" sz="1200" dirty="0" smtClean="0"/>
-              <a:t>6F.‹</a:t>
-            </a:r>
-            <a:r>
-              <a:rPr lang="en-US" sz="1200" dirty="0" smtClean="0"/>
-              <a:t>#›</a:t>
+              <a:t> 6F.‹#›</a:t>
             </a:r>
             <a:endParaRPr lang="en-US" sz="1200" dirty="0"/>
           </a:p>
@@ -20033,7 +19870,7 @@
 </file>
 
 <file path=ppt/slides/slide21.xml><?xml version="1.0" encoding="utf-8"?>
-<p:sld xmlns:a="http://schemas.openxmlformats.org/drawingml/2006/main" xmlns:r="http://schemas.openxmlformats.org/officeDocument/2006/relationships" xmlns:p="http://schemas.openxmlformats.org/presentationml/2006/main">
+<p:sld xmlns:a="http://schemas.openxmlformats.org/drawingml/2006/main" xmlns:r="http://schemas.openxmlformats.org/officeDocument/2006/relationships" xmlns:p="http://schemas.openxmlformats.org/presentationml/2006/main" show="0">
   <p:cSld>
     <p:spTree>
       <p:nvGrpSpPr>
@@ -20100,15 +19937,7 @@
             </a:r>
             <a:r>
               <a:rPr lang="en-US" sz="1200" dirty="0" smtClean="0"/>
-              <a:t> </a:t>
-            </a:r>
-            <a:r>
-              <a:rPr lang="en-US" sz="1200" dirty="0" smtClean="0"/>
-              <a:t>6F.‹</a:t>
-            </a:r>
-            <a:r>
-              <a:rPr lang="en-US" sz="1200" dirty="0" smtClean="0"/>
-              <a:t>#›</a:t>
+              <a:t> 6F.‹#›</a:t>
             </a:r>
             <a:endParaRPr lang="en-US" sz="1200" dirty="0"/>
           </a:p>
@@ -21624,7 +21453,7 @@
 </file>
 
 <file path=ppt/slides/slide22.xml><?xml version="1.0" encoding="utf-8"?>
-<p:sld xmlns:a="http://schemas.openxmlformats.org/drawingml/2006/main" xmlns:r="http://schemas.openxmlformats.org/officeDocument/2006/relationships" xmlns:p="http://schemas.openxmlformats.org/presentationml/2006/main">
+<p:sld xmlns:a="http://schemas.openxmlformats.org/drawingml/2006/main" xmlns:r="http://schemas.openxmlformats.org/officeDocument/2006/relationships" xmlns:p="http://schemas.openxmlformats.org/presentationml/2006/main" show="0">
   <p:cSld>
     <p:spTree>
       <p:nvGrpSpPr>
@@ -21696,11 +21525,7 @@
             <a:pPr eaLnBrk="1" hangingPunct="1"/>
             <a:r>
               <a:rPr lang="en-US" sz="4400" dirty="0" smtClean="0"/>
-              <a:t>about the same size as circuit</a:t>
-            </a:r>
-            <a:r>
-              <a:rPr lang="en-US" sz="4400" dirty="0" smtClean="0"/>
-              <a:t>.</a:t>
+              <a:t>about the same size as circuit.</a:t>
             </a:r>
             <a:endParaRPr lang="en-US" sz="4400" dirty="0"/>
           </a:p>
@@ -21735,11 +21560,7 @@
             </a:r>
             <a:r>
               <a:rPr lang="en-US" dirty="0" smtClean="0"/>
-              <a:t> </a:t>
-            </a:r>
-            <a:r>
-              <a:rPr lang="en-US" dirty="0" smtClean="0"/>
-              <a:t>6F.</a:t>
+              <a:t> 6F.</a:t>
             </a:r>
             <a:fld id="{F389C0C6-D6B8-4BCF-9EE6-7CFCBB0EDCA3}" type="slidenum">
               <a:rPr lang="en-US" smtClean="0"/>
@@ -22173,11 +21994,7 @@
             <a:pPr algn="ctr" eaLnBrk="1" hangingPunct="1"/>
             <a:r>
               <a:rPr lang="en-US" sz="12700" dirty="0" smtClean="0"/>
-              <a:t>1 &amp;</a:t>
-            </a:r>
-            <a:r>
-              <a:rPr lang="en-US" sz="12700" dirty="0" smtClean="0"/>
-              <a:t> </a:t>
+              <a:t>1 &amp; </a:t>
             </a:r>
             <a:r>
               <a:rPr lang="en-US" sz="12700" dirty="0" smtClean="0">
@@ -22218,11 +22035,7 @@
             </a:r>
             <a:r>
               <a:rPr lang="en-US" dirty="0" smtClean="0"/>
-              <a:t> </a:t>
-            </a:r>
-            <a:r>
-              <a:rPr lang="en-US" dirty="0" smtClean="0"/>
-              <a:t>6F.</a:t>
+              <a:t> 6F.</a:t>
             </a:r>
             <a:fld id="{F389C0C6-D6B8-4BCF-9EE6-7CFCBB0EDCA3}" type="slidenum">
               <a:rPr lang="en-US" smtClean="0"/>
@@ -22232,174 +22045,6 @@
               <a:t>23</a:t>
             </a:fld>
             <a:endParaRPr lang="en-US" dirty="0"/>
-          </a:p>
-        </p:txBody>
-      </p:sp>
-    </p:spTree>
-  </p:cSld>
-  <p:clrMapOvr>
-    <a:masterClrMapping/>
-  </p:clrMapOvr>
-  <p:transition xmlns:p14="http://schemas.microsoft.com/office/powerpoint/2010/main"/>
-  <p:timing>
-    <p:tnLst>
-      <p:par>
-        <p:cTn xmlns:p14="http://schemas.microsoft.com/office/powerpoint/2010/main" id="1" dur="indefinite" restart="never" nodeType="tmRoot"/>
-      </p:par>
-    </p:tnLst>
-  </p:timing>
-</p:sld>
-</file>
-
-<file path=ppt/slides/slide24.xml><?xml version="1.0" encoding="utf-8"?>
-<p:sld xmlns:a="http://schemas.openxmlformats.org/drawingml/2006/main" xmlns:r="http://schemas.openxmlformats.org/officeDocument/2006/relationships" xmlns:p="http://schemas.openxmlformats.org/presentationml/2006/main" show="0">
-  <p:cSld>
-    <p:spTree>
-      <p:nvGrpSpPr>
-        <p:cNvPr id="1" name=""/>
-        <p:cNvGrpSpPr/>
-        <p:nvPr/>
-      </p:nvGrpSpPr>
-      <p:grpSpPr>
-        <a:xfrm>
-          <a:off x="0" y="0"/>
-          <a:ext cx="0" cy="0"/>
-          <a:chOff x="0" y="0"/>
-          <a:chExt cx="0" cy="0"/>
-        </a:xfrm>
-      </p:grpSpPr>
-      <p:sp>
-        <p:nvSpPr>
-          <p:cNvPr id="2" name="Title 1"/>
-          <p:cNvSpPr>
-            <a:spLocks noGrp="1"/>
-          </p:cNvSpPr>
-          <p:nvPr>
-            <p:ph type="title"/>
-          </p:nvPr>
-        </p:nvSpPr>
-        <p:spPr/>
-        <p:txBody>
-          <a:bodyPr/>
-          <a:lstStyle/>
-          <a:p>
-            <a:r>
-              <a:rPr lang="en-US" dirty="0" smtClean="0"/>
-              <a:t>Comments</a:t>
-            </a:r>
-            <a:endParaRPr lang="en-US" dirty="0"/>
-          </a:p>
-        </p:txBody>
-      </p:sp>
-      <p:sp>
-        <p:nvSpPr>
-          <p:cNvPr id="3" name="Content Placeholder 2"/>
-          <p:cNvSpPr>
-            <a:spLocks noGrp="1"/>
-          </p:cNvSpPr>
-          <p:nvPr>
-            <p:ph idx="1"/>
-          </p:nvPr>
-        </p:nvSpPr>
-        <p:spPr>
-          <a:xfrm>
-            <a:off x="228600" y="1676400"/>
-            <a:ext cx="8763000" cy="4495800"/>
-          </a:xfrm>
-        </p:spPr>
-        <p:txBody>
-          <a:bodyPr/>
-          <a:lstStyle/>
-          <a:p>
-            <a:pPr>
-              <a:buFont typeface="Arial"/>
-              <a:buChar char="•"/>
-            </a:pPr>
-            <a:r>
-              <a:rPr lang="en-US" dirty="0" smtClean="0"/>
-              <a:t>SAT easy implies factoring easy</a:t>
-            </a:r>
-          </a:p>
-          <a:p>
-            <a:pPr>
-              <a:buFont typeface="Arial"/>
-              <a:buChar char="•"/>
-            </a:pPr>
-            <a:r>
-              <a:rPr lang="en-US" dirty="0" smtClean="0"/>
-              <a:t>RSA security: find key implies factoring</a:t>
-            </a:r>
-          </a:p>
-          <a:p>
-            <a:pPr>
-              <a:buFont typeface="Arial"/>
-              <a:buChar char="•"/>
-            </a:pPr>
-            <a:r>
-              <a:rPr lang="en-US" dirty="0" smtClean="0"/>
-              <a:t>elementary version of Prime # </a:t>
-            </a:r>
-            <a:r>
-              <a:rPr lang="en-US" dirty="0" err="1" smtClean="0"/>
-              <a:t>Thm</a:t>
-            </a:r>
-            <a:r>
-              <a:rPr lang="en-US" dirty="0" smtClean="0"/>
-              <a:t> enough to ensure short search for primes</a:t>
-            </a:r>
-          </a:p>
-          <a:p>
-            <a:pPr>
-              <a:buFont typeface="Arial"/>
-              <a:buChar char="•"/>
-            </a:pPr>
-            <a:r>
-              <a:rPr lang="en-US" dirty="0" smtClean="0"/>
-              <a:t>Use Fermat as probable prime test</a:t>
-            </a:r>
-            <a:endParaRPr lang="en-US" dirty="0"/>
-          </a:p>
-        </p:txBody>
-      </p:sp>
-      <p:sp>
-        <p:nvSpPr>
-          <p:cNvPr id="4" name="Slide Number Placeholder 3"/>
-          <p:cNvSpPr>
-            <a:spLocks noGrp="1"/>
-          </p:cNvSpPr>
-          <p:nvPr>
-            <p:ph type="sldNum" sz="quarter" idx="4"/>
-          </p:nvPr>
-        </p:nvSpPr>
-        <p:spPr/>
-        <p:txBody>
-          <a:bodyPr/>
-          <a:lstStyle/>
-          <a:p>
-            <a:pPr>
-              <a:defRPr/>
-            </a:pPr>
-            <a:r>
-              <a:rPr lang="en-US" dirty="0" err="1" smtClean="0"/>
-              <a:t>l</a:t>
-            </a:r>
-            <a:r>
-              <a:rPr lang="en-US" sz="1200" dirty="0" err="1" smtClean="0"/>
-              <a:t>ec</a:t>
-            </a:r>
-            <a:r>
-              <a:rPr lang="en-US" sz="1200" dirty="0" smtClean="0"/>
-              <a:t> </a:t>
-            </a:r>
-            <a:r>
-              <a:rPr lang="en-US" sz="1200" dirty="0" smtClean="0"/>
-              <a:t>6F.‹</a:t>
-            </a:r>
-            <a:r>
-              <a:rPr lang="en-US" sz="1200" dirty="0" smtClean="0"/>
-              <a:t>#›</a:t>
-            </a:r>
-            <a:endParaRPr lang="en-US" sz="1200" dirty="0"/>
           </a:p>
         </p:txBody>
       </p:sp>
@@ -22465,11 +22110,7 @@
             </a:r>
             <a:r>
               <a:rPr lang="en-US" dirty="0" smtClean="0"/>
-              <a:t> </a:t>
-            </a:r>
-            <a:r>
-              <a:rPr lang="en-US" dirty="0" smtClean="0"/>
-              <a:t>6F.</a:t>
+              <a:t> 6F.</a:t>
             </a:r>
             <a:fld id="{EAE0CE3F-24F2-4E10-908C-002F0BCF9C89}" type="slidenum">
               <a:rPr lang="en-US" smtClean="0"/>
@@ -22762,15 +22403,7 @@
                   <a:srgbClr val="FF00FF"/>
                 </a:solidFill>
               </a:rPr>
-              <a:t>private </a:t>
-            </a:r>
-            <a:r>
-              <a:rPr lang="en-US" sz="4400" dirty="0" smtClean="0">
-                <a:solidFill>
-                  <a:srgbClr val="FF00FF"/>
-                </a:solidFill>
-              </a:rPr>
-              <a:t>key</a:t>
+              <a:t>private key</a:t>
             </a:r>
             <a:r>
               <a:rPr lang="en-US" sz="4400" dirty="0" smtClean="0"/>
@@ -23235,11 +22868,7 @@
             </a:r>
             <a:r>
               <a:rPr lang="en-US" dirty="0" smtClean="0"/>
-              <a:t> </a:t>
-            </a:r>
-            <a:r>
-              <a:rPr lang="en-US" dirty="0" smtClean="0"/>
-              <a:t>6F.</a:t>
+              <a:t> 6F.</a:t>
             </a:r>
             <a:fld id="{2E667B6B-E035-4178-9988-2F3A62346836}" type="slidenum">
               <a:rPr lang="en-US" smtClean="0"/>
@@ -23905,11 +23534,7 @@
             </a:r>
             <a:r>
               <a:rPr lang="en-US" dirty="0" smtClean="0"/>
-              <a:t> </a:t>
-            </a:r>
-            <a:r>
-              <a:rPr lang="en-US" dirty="0" smtClean="0"/>
-              <a:t>6F.</a:t>
+              <a:t> 6F.</a:t>
             </a:r>
             <a:fld id="{3C84E341-AEF3-493B-A8EE-DBBF671E8583}" type="slidenum">
               <a:rPr lang="en-US" smtClean="0"/>
@@ -24087,11 +23712,7 @@
             </a:r>
             <a:r>
               <a:rPr lang="en-US" dirty="0" smtClean="0"/>
-              <a:t> </a:t>
-            </a:r>
-            <a:r>
-              <a:rPr lang="en-US" dirty="0" smtClean="0"/>
-              <a:t>6F.</a:t>
+              <a:t> 6F.</a:t>
             </a:r>
             <a:fld id="{39475D55-F769-4D1E-BA0D-F03B0BEACB86}" type="slidenum">
               <a:rPr lang="en-US" smtClean="0"/>
@@ -24407,11 +24028,7 @@
             </a:r>
             <a:r>
               <a:rPr lang="en-US" dirty="0" smtClean="0"/>
-              <a:t> </a:t>
-            </a:r>
-            <a:r>
-              <a:rPr lang="en-US" dirty="0" smtClean="0"/>
-              <a:t>6F.</a:t>
+              <a:t> 6F.</a:t>
             </a:r>
             <a:fld id="{6A5E9C01-C108-4A5C-AE7A-FB77D488E7D9}" type="slidenum">
               <a:rPr lang="en-US" smtClean="0"/>
@@ -24892,7 +24509,7 @@
 </file>
 
 <file path=ppt/slides/slide8.xml><?xml version="1.0" encoding="utf-8"?>
-<p:sld xmlns:a="http://schemas.openxmlformats.org/drawingml/2006/main" xmlns:r="http://schemas.openxmlformats.org/officeDocument/2006/relationships" xmlns:p="http://schemas.openxmlformats.org/presentationml/2006/main">
+<p:sld xmlns:a="http://schemas.openxmlformats.org/drawingml/2006/main" xmlns:r="http://schemas.openxmlformats.org/officeDocument/2006/relationships" xmlns:p="http://schemas.openxmlformats.org/presentationml/2006/main" show="0">
   <p:cSld>
     <p:spTree>
       <p:nvGrpSpPr>
@@ -24937,11 +24554,7 @@
             </a:r>
             <a:r>
               <a:rPr lang="en-US" dirty="0" smtClean="0"/>
-              <a:t> </a:t>
-            </a:r>
-            <a:r>
-              <a:rPr lang="en-US" dirty="0" smtClean="0"/>
-              <a:t>6F.</a:t>
+              <a:t> 6F.</a:t>
             </a:r>
             <a:fld id="{6A5E9C01-C108-4A5C-AE7A-FB77D488E7D9}" type="slidenum">
               <a:rPr lang="en-US" smtClean="0"/>
@@ -25669,7 +25282,7 @@
 </file>
 
 <file path=ppt/slides/slide9.xml><?xml version="1.0" encoding="utf-8"?>
-<p:sld xmlns:a="http://schemas.openxmlformats.org/drawingml/2006/main" xmlns:r="http://schemas.openxmlformats.org/officeDocument/2006/relationships" xmlns:p="http://schemas.openxmlformats.org/presentationml/2006/main">
+<p:sld xmlns:a="http://schemas.openxmlformats.org/drawingml/2006/main" xmlns:r="http://schemas.openxmlformats.org/officeDocument/2006/relationships" xmlns:p="http://schemas.openxmlformats.org/presentationml/2006/main" show="0">
   <p:cSld>
     <p:spTree>
       <p:nvGrpSpPr>
@@ -25714,11 +25327,7 @@
             </a:r>
             <a:r>
               <a:rPr lang="en-US" dirty="0" smtClean="0"/>
-              <a:t> </a:t>
-            </a:r>
-            <a:r>
-              <a:rPr lang="en-US" dirty="0" smtClean="0"/>
-              <a:t>6F.</a:t>
+              <a:t> 6F.</a:t>
             </a:r>
             <a:fld id="{6A5E9C01-C108-4A5C-AE7A-FB77D488E7D9}" type="slidenum">
               <a:rPr lang="en-US" smtClean="0"/>

</xml_diff>